<commit_message>
Ready for first rough presentation.
</commit_message>
<xml_diff>
--- a/src/end-to-end-example/Presentation/Clean Architecture with .Net Core.pptx
+++ b/src/end-to-end-example/Presentation/Clean Architecture with .Net Core.pptx
@@ -5,7 +5,7 @@
     <p:sldMasterId id="2147483648" r:id="rId1"/>
   </p:sldMasterIdLst>
   <p:notesMasterIdLst>
-    <p:notesMasterId r:id="rId15"/>
+    <p:notesMasterId r:id="rId18"/>
   </p:notesMasterIdLst>
   <p:sldIdLst>
     <p:sldId id="256" r:id="rId2"/>
@@ -21,6 +21,9 @@
     <p:sldId id="268" r:id="rId12"/>
     <p:sldId id="269" r:id="rId13"/>
     <p:sldId id="267" r:id="rId14"/>
+    <p:sldId id="270" r:id="rId15"/>
+    <p:sldId id="271" r:id="rId16"/>
+    <p:sldId id="272" r:id="rId17"/>
   </p:sldIdLst>
   <p:sldSz cx="12192000" cy="6858000"/>
   <p:notesSz cx="6858000" cy="9144000"/>
@@ -152,10 +155,15 @@
           </p14:sldIdLst>
         </p14:section>
         <p14:section name="Persistence" id="{C6C25EBB-70C3-465A-A7DD-1AC9B3500E00}">
-          <p14:sldIdLst/>
+          <p14:sldIdLst>
+            <p14:sldId id="270"/>
+            <p14:sldId id="271"/>
+          </p14:sldIdLst>
         </p14:section>
         <p14:section name="Infrastructure" id="{9BDD4419-204E-47AC-8DDE-4FA796E8A1B8}">
-          <p14:sldIdLst/>
+          <p14:sldIdLst>
+            <p14:sldId id="272"/>
+          </p14:sldIdLst>
         </p14:section>
         <p14:section name="Presentation" id="{05D85DA7-8732-453F-9CF4-162FECB6466A}">
           <p14:sldIdLst/>
@@ -929,6 +937,246 @@
     <p:extLst>
       <p:ext uri="{BB962C8B-B14F-4D97-AF65-F5344CB8AC3E}">
         <p14:creationId xmlns:p14="http://schemas.microsoft.com/office/powerpoint/2010/main" val="1079763082"/>
+      </p:ext>
+    </p:extLst>
+  </p:cSld>
+  <p:clrMapOvr>
+    <a:masterClrMapping/>
+  </p:clrMapOvr>
+</p:notes>
+</file>
+
+<file path=ppt/notesSlides/notesSlide4.xml><?xml version="1.0" encoding="utf-8"?>
+<p:notes xmlns:a="http://schemas.openxmlformats.org/drawingml/2006/main" xmlns:r="http://schemas.openxmlformats.org/officeDocument/2006/relationships" xmlns:p="http://schemas.openxmlformats.org/presentationml/2006/main">
+  <p:cSld>
+    <p:spTree>
+      <p:nvGrpSpPr>
+        <p:cNvPr id="1" name=""/>
+        <p:cNvGrpSpPr/>
+        <p:nvPr/>
+      </p:nvGrpSpPr>
+      <p:grpSpPr>
+        <a:xfrm>
+          <a:off x="0" y="0"/>
+          <a:ext cx="0" cy="0"/>
+          <a:chOff x="0" y="0"/>
+          <a:chExt cx="0" cy="0"/>
+        </a:xfrm>
+      </p:grpSpPr>
+      <p:sp>
+        <p:nvSpPr>
+          <p:cNvPr id="2" name="Slide Image Placeholder 1"/>
+          <p:cNvSpPr>
+            <a:spLocks noGrp="1" noRot="1" noChangeAspect="1"/>
+          </p:cNvSpPr>
+          <p:nvPr>
+            <p:ph type="sldImg"/>
+          </p:nvPr>
+        </p:nvSpPr>
+        <p:spPr/>
+      </p:sp>
+      <p:sp>
+        <p:nvSpPr>
+          <p:cNvPr id="3" name="Notes Placeholder 2"/>
+          <p:cNvSpPr>
+            <a:spLocks noGrp="1"/>
+          </p:cNvSpPr>
+          <p:nvPr>
+            <p:ph type="body" idx="1"/>
+          </p:nvPr>
+        </p:nvSpPr>
+        <p:spPr/>
+        <p:txBody>
+          <a:bodyPr/>
+          <a:lstStyle/>
+          <a:p>
+            <a:r>
+              <a:rPr lang="en-US" dirty="0"/>
+              <a:t>Interfaces</a:t>
+            </a:r>
+          </a:p>
+          <a:p>
+            <a:r>
+              <a:rPr lang="en-US" dirty="0"/>
+              <a:t>Models</a:t>
+            </a:r>
+          </a:p>
+          <a:p>
+            <a:r>
+              <a:rPr lang="en-US" dirty="0"/>
+              <a:t>Logic</a:t>
+            </a:r>
+          </a:p>
+          <a:p>
+            <a:r>
+              <a:rPr lang="en-US" dirty="0"/>
+              <a:t>Commands and Queries</a:t>
+            </a:r>
+          </a:p>
+          <a:p>
+            <a:r>
+              <a:rPr lang="en-US" dirty="0"/>
+              <a:t>Validators</a:t>
+            </a:r>
+          </a:p>
+          <a:p>
+            <a:r>
+              <a:rPr lang="en-US" dirty="0"/>
+              <a:t>Exceptions</a:t>
+            </a:r>
+          </a:p>
+          <a:p>
+            <a:endParaRPr lang="en-US" dirty="0"/>
+          </a:p>
+        </p:txBody>
+      </p:sp>
+      <p:sp>
+        <p:nvSpPr>
+          <p:cNvPr id="4" name="Slide Number Placeholder 3"/>
+          <p:cNvSpPr>
+            <a:spLocks noGrp="1"/>
+          </p:cNvSpPr>
+          <p:nvPr>
+            <p:ph type="sldNum" sz="quarter" idx="5"/>
+          </p:nvPr>
+        </p:nvSpPr>
+        <p:spPr/>
+        <p:txBody>
+          <a:bodyPr/>
+          <a:lstStyle/>
+          <a:p>
+            <a:fld id="{9CC384C5-65D9-4499-AA7B-F76C8AC73AD2}" type="slidenum">
+              <a:rPr lang="en-US" smtClean="0"/>
+              <a:t>14</a:t>
+            </a:fld>
+            <a:endParaRPr lang="en-US"/>
+          </a:p>
+        </p:txBody>
+      </p:sp>
+    </p:spTree>
+    <p:extLst>
+      <p:ext uri="{BB962C8B-B14F-4D97-AF65-F5344CB8AC3E}">
+        <p14:creationId xmlns:p14="http://schemas.microsoft.com/office/powerpoint/2010/main" val="3676298771"/>
+      </p:ext>
+    </p:extLst>
+  </p:cSld>
+  <p:clrMapOvr>
+    <a:masterClrMapping/>
+  </p:clrMapOvr>
+</p:notes>
+</file>
+
+<file path=ppt/notesSlides/notesSlide5.xml><?xml version="1.0" encoding="utf-8"?>
+<p:notes xmlns:a="http://schemas.openxmlformats.org/drawingml/2006/main" xmlns:r="http://schemas.openxmlformats.org/officeDocument/2006/relationships" xmlns:p="http://schemas.openxmlformats.org/presentationml/2006/main">
+  <p:cSld>
+    <p:spTree>
+      <p:nvGrpSpPr>
+        <p:cNvPr id="1" name=""/>
+        <p:cNvGrpSpPr/>
+        <p:nvPr/>
+      </p:nvGrpSpPr>
+      <p:grpSpPr>
+        <a:xfrm>
+          <a:off x="0" y="0"/>
+          <a:ext cx="0" cy="0"/>
+          <a:chOff x="0" y="0"/>
+          <a:chExt cx="0" cy="0"/>
+        </a:xfrm>
+      </p:grpSpPr>
+      <p:sp>
+        <p:nvSpPr>
+          <p:cNvPr id="2" name="Slide Image Placeholder 1"/>
+          <p:cNvSpPr>
+            <a:spLocks noGrp="1" noRot="1" noChangeAspect="1"/>
+          </p:cNvSpPr>
+          <p:nvPr>
+            <p:ph type="sldImg"/>
+          </p:nvPr>
+        </p:nvSpPr>
+        <p:spPr/>
+      </p:sp>
+      <p:sp>
+        <p:nvSpPr>
+          <p:cNvPr id="3" name="Notes Placeholder 2"/>
+          <p:cNvSpPr>
+            <a:spLocks noGrp="1"/>
+          </p:cNvSpPr>
+          <p:nvPr>
+            <p:ph type="body" idx="1"/>
+          </p:nvPr>
+        </p:nvSpPr>
+        <p:spPr/>
+        <p:txBody>
+          <a:bodyPr/>
+          <a:lstStyle/>
+          <a:p>
+            <a:r>
+              <a:rPr lang="en-US" dirty="0"/>
+              <a:t>Interfaces</a:t>
+            </a:r>
+          </a:p>
+          <a:p>
+            <a:r>
+              <a:rPr lang="en-US" dirty="0"/>
+              <a:t>Models</a:t>
+            </a:r>
+          </a:p>
+          <a:p>
+            <a:r>
+              <a:rPr lang="en-US" dirty="0"/>
+              <a:t>Logic</a:t>
+            </a:r>
+          </a:p>
+          <a:p>
+            <a:r>
+              <a:rPr lang="en-US" dirty="0"/>
+              <a:t>Commands and Queries</a:t>
+            </a:r>
+          </a:p>
+          <a:p>
+            <a:r>
+              <a:rPr lang="en-US" dirty="0"/>
+              <a:t>Validators</a:t>
+            </a:r>
+          </a:p>
+          <a:p>
+            <a:r>
+              <a:rPr lang="en-US" dirty="0"/>
+              <a:t>Exceptions</a:t>
+            </a:r>
+          </a:p>
+          <a:p>
+            <a:endParaRPr lang="en-US" dirty="0"/>
+          </a:p>
+        </p:txBody>
+      </p:sp>
+      <p:sp>
+        <p:nvSpPr>
+          <p:cNvPr id="4" name="Slide Number Placeholder 3"/>
+          <p:cNvSpPr>
+            <a:spLocks noGrp="1"/>
+          </p:cNvSpPr>
+          <p:nvPr>
+            <p:ph type="sldNum" sz="quarter" idx="5"/>
+          </p:nvPr>
+        </p:nvSpPr>
+        <p:spPr/>
+        <p:txBody>
+          <a:bodyPr/>
+          <a:lstStyle/>
+          <a:p>
+            <a:fld id="{9CC384C5-65D9-4499-AA7B-F76C8AC73AD2}" type="slidenum">
+              <a:rPr lang="en-US" smtClean="0"/>
+              <a:t>16</a:t>
+            </a:fld>
+            <a:endParaRPr lang="en-US"/>
+          </a:p>
+        </p:txBody>
+      </p:sp>
+    </p:spTree>
+    <p:extLst>
+      <p:ext uri="{BB962C8B-B14F-4D97-AF65-F5344CB8AC3E}">
+        <p14:creationId xmlns:p14="http://schemas.microsoft.com/office/powerpoint/2010/main" val="3292058314"/>
       </p:ext>
     </p:extLst>
   </p:cSld>
@@ -7758,7 +8006,9 @@
         </p:nvSpPr>
         <p:spPr/>
         <p:txBody>
-          <a:bodyPr/>
+          <a:bodyPr>
+            <a:normAutofit fontScale="92500" lnSpcReduction="10000"/>
+          </a:bodyPr>
           <a:lstStyle/>
           <a:p>
             <a:pPr marL="0" indent="0">
@@ -7769,7 +8019,7 @@
             </a:pPr>
             <a:r>
               <a:rPr lang="en-US" dirty="0"/>
-              <a:t>Use data annotations sparingly, or not at all</a:t>
+              <a:t>Independent of infrastructure and data access concerns</a:t>
             </a:r>
           </a:p>
           <a:p>
@@ -7781,7 +8031,7 @@
             </a:pPr>
             <a:r>
               <a:rPr lang="en-US" dirty="0"/>
-              <a:t>Use value types where appropriate</a:t>
+              <a:t>CQRS Simplifies your design</a:t>
             </a:r>
           </a:p>
           <a:p>
@@ -7793,8 +8043,13 @@
             </a:pPr>
             <a:r>
               <a:rPr lang="en-US" dirty="0"/>
-              <a:t>Initialize all collections and use private setters</a:t>
-            </a:r>
+              <a:t>    Better with </a:t>
+            </a:r>
+            <a:r>
+              <a:rPr lang="en-US" dirty="0" err="1"/>
+              <a:t>MediatR</a:t>
+            </a:r>
+            <a:endParaRPr lang="en-US" dirty="0"/>
           </a:p>
           <a:p>
             <a:pPr marL="0" indent="0">
@@ -7805,7 +8060,23 @@
             </a:pPr>
             <a:r>
               <a:rPr lang="en-US" dirty="0"/>
-              <a:t>Create custom domain exceptions</a:t>
+              <a:t>Fluent validation is useful for simple and complex validation scenarios</a:t>
+            </a:r>
+          </a:p>
+          <a:p>
+            <a:pPr marL="0" indent="0">
+              <a:lnSpc>
+                <a:spcPct val="200000"/>
+              </a:lnSpc>
+              <a:buNone/>
+            </a:pPr>
+            <a:r>
+              <a:rPr lang="en-US" dirty="0" err="1"/>
+              <a:t>MediatR</a:t>
+            </a:r>
+            <a:r>
+              <a:rPr lang="en-US" dirty="0"/>
+              <a:t> simplifies crosscutting concerns such as logging and validation</a:t>
             </a:r>
           </a:p>
         </p:txBody>
@@ -8240,6 +8511,109 @@
                       </p:childTnLst>
                     </p:cTn>
                   </p:par>
+                  <p:par>
+                    <p:cTn id="27" fill="hold">
+                      <p:stCondLst>
+                        <p:cond delay="indefinite"/>
+                      </p:stCondLst>
+                      <p:childTnLst>
+                        <p:par>
+                          <p:cTn id="28" fill="hold">
+                            <p:stCondLst>
+                              <p:cond delay="0"/>
+                            </p:stCondLst>
+                            <p:childTnLst>
+                              <p:par>
+                                <p:cTn id="29" presetID="2" presetClass="entr" presetSubtype="4" fill="hold" grpId="0" nodeType="clickEffect">
+                                  <p:stCondLst>
+                                    <p:cond delay="0"/>
+                                  </p:stCondLst>
+                                  <p:childTnLst>
+                                    <p:set>
+                                      <p:cBhvr>
+                                        <p:cTn id="30" dur="1" fill="hold">
+                                          <p:stCondLst>
+                                            <p:cond delay="0"/>
+                                          </p:stCondLst>
+                                        </p:cTn>
+                                        <p:tgtEl>
+                                          <p:spTgt spid="3">
+                                            <p:txEl>
+                                              <p:pRg st="4" end="4"/>
+                                            </p:txEl>
+                                          </p:spTgt>
+                                        </p:tgtEl>
+                                        <p:attrNameLst>
+                                          <p:attrName>style.visibility</p:attrName>
+                                        </p:attrNameLst>
+                                      </p:cBhvr>
+                                      <p:to>
+                                        <p:strVal val="visible"/>
+                                      </p:to>
+                                    </p:set>
+                                    <p:anim calcmode="lin" valueType="num">
+                                      <p:cBhvr additive="base">
+                                        <p:cTn id="31" dur="500" fill="hold"/>
+                                        <p:tgtEl>
+                                          <p:spTgt spid="3">
+                                            <p:txEl>
+                                              <p:pRg st="4" end="4"/>
+                                            </p:txEl>
+                                          </p:spTgt>
+                                        </p:tgtEl>
+                                        <p:attrNameLst>
+                                          <p:attrName>ppt_x</p:attrName>
+                                        </p:attrNameLst>
+                                      </p:cBhvr>
+                                      <p:tavLst>
+                                        <p:tav tm="0">
+                                          <p:val>
+                                            <p:strVal val="#ppt_x"/>
+                                          </p:val>
+                                        </p:tav>
+                                        <p:tav tm="100000">
+                                          <p:val>
+                                            <p:strVal val="#ppt_x"/>
+                                          </p:val>
+                                        </p:tav>
+                                      </p:tavLst>
+                                    </p:anim>
+                                    <p:anim calcmode="lin" valueType="num">
+                                      <p:cBhvr additive="base">
+                                        <p:cTn id="32" dur="500" fill="hold"/>
+                                        <p:tgtEl>
+                                          <p:spTgt spid="3">
+                                            <p:txEl>
+                                              <p:pRg st="4" end="4"/>
+                                            </p:txEl>
+                                          </p:spTgt>
+                                        </p:tgtEl>
+                                        <p:attrNameLst>
+                                          <p:attrName>ppt_y</p:attrName>
+                                        </p:attrNameLst>
+                                      </p:cBhvr>
+                                      <p:tavLst>
+                                        <p:tav tm="0">
+                                          <p:val>
+                                            <p:strVal val="1+#ppt_h/2"/>
+                                          </p:val>
+                                        </p:tav>
+                                        <p:tav tm="100000">
+                                          <p:val>
+                                            <p:strVal val="#ppt_y"/>
+                                          </p:val>
+                                        </p:tav>
+                                      </p:tavLst>
+                                    </p:anim>
+                                  </p:childTnLst>
+                                </p:cTn>
+                              </p:par>
+                            </p:childTnLst>
+                          </p:cTn>
+                        </p:par>
+                      </p:childTnLst>
+                    </p:cTn>
+                  </p:par>
                 </p:childTnLst>
               </p:cTn>
               <p:prevCondLst>
@@ -8263,6 +8637,4137 @@
     </p:tnLst>
     <p:bldLst>
       <p:bldP spid="3" grpId="0" build="p"/>
+    </p:bldLst>
+  </p:timing>
+</p:sld>
+</file>
+
+<file path=ppt/slides/slide14.xml><?xml version="1.0" encoding="utf-8"?>
+<p:sld xmlns:a="http://schemas.openxmlformats.org/drawingml/2006/main" xmlns:r="http://schemas.openxmlformats.org/officeDocument/2006/relationships" xmlns:p="http://schemas.openxmlformats.org/presentationml/2006/main">
+  <p:cSld>
+    <p:spTree>
+      <p:nvGrpSpPr>
+        <p:cNvPr id="1" name=""/>
+        <p:cNvGrpSpPr/>
+        <p:nvPr/>
+      </p:nvGrpSpPr>
+      <p:grpSpPr>
+        <a:xfrm>
+          <a:off x="0" y="0"/>
+          <a:ext cx="0" cy="0"/>
+          <a:chOff x="0" y="0"/>
+          <a:chExt cx="0" cy="0"/>
+        </a:xfrm>
+      </p:grpSpPr>
+      <p:sp>
+        <p:nvSpPr>
+          <p:cNvPr id="2" name="Title 1">
+            <a:extLst>
+              <a:ext uri="{FF2B5EF4-FFF2-40B4-BE49-F238E27FC236}">
+                <a16:creationId xmlns:a16="http://schemas.microsoft.com/office/drawing/2014/main" id="{78FDD8E7-6A43-4299-907D-9BA02491DC79}"/>
+              </a:ext>
+            </a:extLst>
+          </p:cNvPr>
+          <p:cNvSpPr>
+            <a:spLocks noGrp="1"/>
+          </p:cNvSpPr>
+          <p:nvPr>
+            <p:ph type="title"/>
+          </p:nvPr>
+        </p:nvSpPr>
+        <p:spPr/>
+        <p:txBody>
+          <a:bodyPr/>
+          <a:lstStyle/>
+          <a:p>
+            <a:r>
+              <a:rPr lang="en-US" dirty="0"/>
+              <a:t>Persistence Overview</a:t>
+            </a:r>
+          </a:p>
+        </p:txBody>
+      </p:sp>
+      <p:sp>
+        <p:nvSpPr>
+          <p:cNvPr id="8" name="Block Arc 7">
+            <a:extLst>
+              <a:ext uri="{FF2B5EF4-FFF2-40B4-BE49-F238E27FC236}">
+                <a16:creationId xmlns:a16="http://schemas.microsoft.com/office/drawing/2014/main" id="{E71EEED1-4B45-43F9-B419-D7A88B36F4C4}"/>
+              </a:ext>
+            </a:extLst>
+          </p:cNvPr>
+          <p:cNvSpPr/>
+          <p:nvPr/>
+        </p:nvSpPr>
+        <p:spPr>
+          <a:xfrm>
+            <a:off x="6639535" y="1834622"/>
+            <a:ext cx="4874365" cy="4874364"/>
+          </a:xfrm>
+          <a:prstGeom prst="blockArc">
+            <a:avLst>
+              <a:gd name="adj1" fmla="val 10800000"/>
+              <a:gd name="adj2" fmla="val 0"/>
+              <a:gd name="adj3" fmla="val 14179"/>
+            </a:avLst>
+          </a:prstGeom>
+          <a:solidFill>
+            <a:schemeClr val="bg2">
+              <a:lumMod val="75000"/>
+            </a:schemeClr>
+          </a:solidFill>
+        </p:spPr>
+        <p:style>
+          <a:lnRef idx="2">
+            <a:schemeClr val="accent1">
+              <a:shade val="50000"/>
+            </a:schemeClr>
+          </a:lnRef>
+          <a:fillRef idx="1">
+            <a:schemeClr val="accent1"/>
+          </a:fillRef>
+          <a:effectRef idx="0">
+            <a:schemeClr val="accent1"/>
+          </a:effectRef>
+          <a:fontRef idx="minor">
+            <a:schemeClr val="lt1"/>
+          </a:fontRef>
+        </p:style>
+        <p:txBody>
+          <a:bodyPr rtlCol="0" anchor="ctr"/>
+          <a:lstStyle/>
+          <a:p>
+            <a:pPr algn="ctr"/>
+            <a:endParaRPr lang="en-US">
+              <a:solidFill>
+                <a:schemeClr val="tx1"/>
+              </a:solidFill>
+            </a:endParaRPr>
+          </a:p>
+        </p:txBody>
+      </p:sp>
+      <p:sp>
+        <p:nvSpPr>
+          <p:cNvPr id="9" name="Block Arc 8">
+            <a:extLst>
+              <a:ext uri="{FF2B5EF4-FFF2-40B4-BE49-F238E27FC236}">
+                <a16:creationId xmlns:a16="http://schemas.microsoft.com/office/drawing/2014/main" id="{86AB1127-5F5C-48FE-A1F9-D691FE898A9D}"/>
+              </a:ext>
+            </a:extLst>
+          </p:cNvPr>
+          <p:cNvSpPr/>
+          <p:nvPr/>
+        </p:nvSpPr>
+        <p:spPr>
+          <a:xfrm flipV="1">
+            <a:off x="6640656" y="1838552"/>
+            <a:ext cx="4874365" cy="4874364"/>
+          </a:xfrm>
+          <a:prstGeom prst="blockArc">
+            <a:avLst>
+              <a:gd name="adj1" fmla="val 16219981"/>
+              <a:gd name="adj2" fmla="val 0"/>
+              <a:gd name="adj3" fmla="val 14179"/>
+            </a:avLst>
+          </a:prstGeom>
+          <a:solidFill>
+            <a:schemeClr val="bg2">
+              <a:lumMod val="75000"/>
+            </a:schemeClr>
+          </a:solidFill>
+        </p:spPr>
+        <p:style>
+          <a:lnRef idx="2">
+            <a:schemeClr val="accent1">
+              <a:shade val="50000"/>
+            </a:schemeClr>
+          </a:lnRef>
+          <a:fillRef idx="1">
+            <a:schemeClr val="accent1"/>
+          </a:fillRef>
+          <a:effectRef idx="0">
+            <a:schemeClr val="accent1"/>
+          </a:effectRef>
+          <a:fontRef idx="minor">
+            <a:schemeClr val="lt1"/>
+          </a:fontRef>
+        </p:style>
+        <p:txBody>
+          <a:bodyPr rtlCol="0" anchor="ctr"/>
+          <a:lstStyle/>
+          <a:p>
+            <a:pPr algn="ctr"/>
+            <a:endParaRPr lang="en-US">
+              <a:solidFill>
+                <a:schemeClr val="tx1"/>
+              </a:solidFill>
+            </a:endParaRPr>
+          </a:p>
+        </p:txBody>
+      </p:sp>
+      <p:sp>
+        <p:nvSpPr>
+          <p:cNvPr id="10" name="Block Arc 9">
+            <a:extLst>
+              <a:ext uri="{FF2B5EF4-FFF2-40B4-BE49-F238E27FC236}">
+                <a16:creationId xmlns:a16="http://schemas.microsoft.com/office/drawing/2014/main" id="{8182EE53-756B-4A2D-83DD-7A858D1CAF20}"/>
+              </a:ext>
+            </a:extLst>
+          </p:cNvPr>
+          <p:cNvSpPr/>
+          <p:nvPr/>
+        </p:nvSpPr>
+        <p:spPr>
+          <a:xfrm flipH="1" flipV="1">
+            <a:off x="6640094" y="1838002"/>
+            <a:ext cx="4874365" cy="4874364"/>
+          </a:xfrm>
+          <a:prstGeom prst="blockArc">
+            <a:avLst>
+              <a:gd name="adj1" fmla="val 16183083"/>
+              <a:gd name="adj2" fmla="val 0"/>
+              <a:gd name="adj3" fmla="val 14179"/>
+            </a:avLst>
+          </a:prstGeom>
+          <a:solidFill>
+            <a:srgbClr val="92D050"/>
+          </a:solidFill>
+        </p:spPr>
+        <p:style>
+          <a:lnRef idx="2">
+            <a:schemeClr val="accent1">
+              <a:shade val="50000"/>
+            </a:schemeClr>
+          </a:lnRef>
+          <a:fillRef idx="1">
+            <a:schemeClr val="accent1"/>
+          </a:fillRef>
+          <a:effectRef idx="0">
+            <a:schemeClr val="accent1"/>
+          </a:effectRef>
+          <a:fontRef idx="minor">
+            <a:schemeClr val="lt1"/>
+          </a:fontRef>
+        </p:style>
+        <p:txBody>
+          <a:bodyPr rtlCol="0" anchor="ctr"/>
+          <a:lstStyle/>
+          <a:p>
+            <a:pPr algn="ctr"/>
+            <a:endParaRPr lang="en-US">
+              <a:solidFill>
+                <a:schemeClr val="tx1"/>
+              </a:solidFill>
+            </a:endParaRPr>
+          </a:p>
+        </p:txBody>
+      </p:sp>
+      <p:sp>
+        <p:nvSpPr>
+          <p:cNvPr id="11" name="Circle: Hollow 10">
+            <a:extLst>
+              <a:ext uri="{FF2B5EF4-FFF2-40B4-BE49-F238E27FC236}">
+                <a16:creationId xmlns:a16="http://schemas.microsoft.com/office/drawing/2014/main" id="{3B768160-05EA-4308-8DE9-6F4B958F4AD0}"/>
+              </a:ext>
+            </a:extLst>
+          </p:cNvPr>
+          <p:cNvSpPr/>
+          <p:nvPr/>
+        </p:nvSpPr>
+        <p:spPr>
+          <a:xfrm>
+            <a:off x="7334907" y="2531398"/>
+            <a:ext cx="3484742" cy="3484740"/>
+          </a:xfrm>
+          <a:prstGeom prst="donut">
+            <a:avLst>
+              <a:gd name="adj" fmla="val 21109"/>
+            </a:avLst>
+          </a:prstGeom>
+          <a:solidFill>
+            <a:schemeClr val="bg2">
+              <a:lumMod val="75000"/>
+            </a:schemeClr>
+          </a:solidFill>
+        </p:spPr>
+        <p:style>
+          <a:lnRef idx="2">
+            <a:schemeClr val="accent1">
+              <a:shade val="50000"/>
+            </a:schemeClr>
+          </a:lnRef>
+          <a:fillRef idx="1">
+            <a:schemeClr val="accent1"/>
+          </a:fillRef>
+          <a:effectRef idx="0">
+            <a:schemeClr val="accent1"/>
+          </a:effectRef>
+          <a:fontRef idx="minor">
+            <a:schemeClr val="lt1"/>
+          </a:fontRef>
+        </p:style>
+        <p:txBody>
+          <a:bodyPr rtlCol="0" anchor="ctr"/>
+          <a:lstStyle/>
+          <a:p>
+            <a:pPr algn="ctr"/>
+            <a:endParaRPr lang="en-US" dirty="0">
+              <a:solidFill>
+                <a:schemeClr val="tx1"/>
+              </a:solidFill>
+            </a:endParaRPr>
+          </a:p>
+        </p:txBody>
+      </p:sp>
+      <p:sp>
+        <p:nvSpPr>
+          <p:cNvPr id="13" name="Oval 12">
+            <a:extLst>
+              <a:ext uri="{FF2B5EF4-FFF2-40B4-BE49-F238E27FC236}">
+                <a16:creationId xmlns:a16="http://schemas.microsoft.com/office/drawing/2014/main" id="{6B632BF4-A365-49C5-90AA-107A908D835E}"/>
+              </a:ext>
+            </a:extLst>
+          </p:cNvPr>
+          <p:cNvSpPr/>
+          <p:nvPr/>
+        </p:nvSpPr>
+        <p:spPr>
+          <a:xfrm>
+            <a:off x="8078232" y="3274723"/>
+            <a:ext cx="1998094" cy="1998092"/>
+          </a:xfrm>
+          <a:prstGeom prst="ellipse">
+            <a:avLst/>
+          </a:prstGeom>
+          <a:solidFill>
+            <a:schemeClr val="bg2">
+              <a:lumMod val="75000"/>
+            </a:schemeClr>
+          </a:solidFill>
+        </p:spPr>
+        <p:style>
+          <a:lnRef idx="2">
+            <a:schemeClr val="accent1">
+              <a:shade val="50000"/>
+            </a:schemeClr>
+          </a:lnRef>
+          <a:fillRef idx="1">
+            <a:schemeClr val="accent1"/>
+          </a:fillRef>
+          <a:effectRef idx="0">
+            <a:schemeClr val="accent1"/>
+          </a:effectRef>
+          <a:fontRef idx="minor">
+            <a:schemeClr val="lt1"/>
+          </a:fontRef>
+        </p:style>
+        <p:txBody>
+          <a:bodyPr rtlCol="0" anchor="ctr"/>
+          <a:lstStyle/>
+          <a:p>
+            <a:pPr algn="ctr"/>
+            <a:r>
+              <a:rPr lang="en-US" dirty="0"/>
+              <a:t>Domain</a:t>
+            </a:r>
+          </a:p>
+        </p:txBody>
+      </p:sp>
+      <p:sp>
+        <p:nvSpPr>
+          <p:cNvPr id="14" name="TextBox 13">
+            <a:extLst>
+              <a:ext uri="{FF2B5EF4-FFF2-40B4-BE49-F238E27FC236}">
+                <a16:creationId xmlns:a16="http://schemas.microsoft.com/office/drawing/2014/main" id="{114D07BD-35F4-4D52-872D-1878379108A2}"/>
+              </a:ext>
+            </a:extLst>
+          </p:cNvPr>
+          <p:cNvSpPr txBox="1"/>
+          <p:nvPr/>
+        </p:nvSpPr>
+        <p:spPr>
+          <a:xfrm>
+            <a:off x="8454204" y="2737474"/>
+            <a:ext cx="1245021" cy="369332"/>
+          </a:xfrm>
+          <a:prstGeom prst="rect">
+            <a:avLst/>
+          </a:prstGeom>
+          <a:noFill/>
+        </p:spPr>
+        <p:txBody>
+          <a:bodyPr wrap="none" rtlCol="0">
+            <a:spAutoFit/>
+          </a:bodyPr>
+          <a:lstStyle/>
+          <a:p>
+            <a:pPr algn="ctr"/>
+            <a:r>
+              <a:rPr lang="en-US" dirty="0">
+                <a:solidFill>
+                  <a:schemeClr val="bg1"/>
+                </a:solidFill>
+              </a:rPr>
+              <a:t>Application</a:t>
+            </a:r>
+          </a:p>
+        </p:txBody>
+      </p:sp>
+      <p:sp>
+        <p:nvSpPr>
+          <p:cNvPr id="15" name="TextBox 14">
+            <a:extLst>
+              <a:ext uri="{FF2B5EF4-FFF2-40B4-BE49-F238E27FC236}">
+                <a16:creationId xmlns:a16="http://schemas.microsoft.com/office/drawing/2014/main" id="{041EA6B2-886C-49A8-AD0E-EBBB070F07C3}"/>
+              </a:ext>
+            </a:extLst>
+          </p:cNvPr>
+          <p:cNvSpPr txBox="1"/>
+          <p:nvPr/>
+        </p:nvSpPr>
+        <p:spPr>
+          <a:xfrm>
+            <a:off x="8388290" y="2006213"/>
+            <a:ext cx="1376851" cy="369332"/>
+          </a:xfrm>
+          <a:prstGeom prst="rect">
+            <a:avLst/>
+          </a:prstGeom>
+          <a:noFill/>
+        </p:spPr>
+        <p:txBody>
+          <a:bodyPr wrap="none" rtlCol="0">
+            <a:spAutoFit/>
+          </a:bodyPr>
+          <a:lstStyle/>
+          <a:p>
+            <a:pPr algn="ctr"/>
+            <a:r>
+              <a:rPr lang="en-US" dirty="0">
+                <a:solidFill>
+                  <a:schemeClr val="bg1"/>
+                </a:solidFill>
+              </a:rPr>
+              <a:t>Presentation</a:t>
+            </a:r>
+          </a:p>
+        </p:txBody>
+      </p:sp>
+      <p:sp>
+        <p:nvSpPr>
+          <p:cNvPr id="16" name="TextBox 15">
+            <a:extLst>
+              <a:ext uri="{FF2B5EF4-FFF2-40B4-BE49-F238E27FC236}">
+                <a16:creationId xmlns:a16="http://schemas.microsoft.com/office/drawing/2014/main" id="{DEA856A3-5C85-4201-B42A-5BDCE9843410}"/>
+              </a:ext>
+            </a:extLst>
+          </p:cNvPr>
+          <p:cNvSpPr txBox="1"/>
+          <p:nvPr/>
+        </p:nvSpPr>
+        <p:spPr>
+          <a:xfrm rot="2993722">
+            <a:off x="6964049" y="5418928"/>
+            <a:ext cx="1245020" cy="369332"/>
+          </a:xfrm>
+          <a:prstGeom prst="rect">
+            <a:avLst/>
+          </a:prstGeom>
+          <a:noFill/>
+        </p:spPr>
+        <p:txBody>
+          <a:bodyPr wrap="none" rtlCol="0">
+            <a:spAutoFit/>
+          </a:bodyPr>
+          <a:lstStyle/>
+          <a:p>
+            <a:pPr algn="ctr"/>
+            <a:r>
+              <a:rPr lang="en-US" dirty="0">
+                <a:solidFill>
+                  <a:schemeClr val="bg1"/>
+                </a:solidFill>
+              </a:rPr>
+              <a:t>Persistence</a:t>
+            </a:r>
+          </a:p>
+        </p:txBody>
+      </p:sp>
+      <p:sp>
+        <p:nvSpPr>
+          <p:cNvPr id="17" name="TextBox 16">
+            <a:extLst>
+              <a:ext uri="{FF2B5EF4-FFF2-40B4-BE49-F238E27FC236}">
+                <a16:creationId xmlns:a16="http://schemas.microsoft.com/office/drawing/2014/main" id="{D667BF82-4852-4145-85E8-985151A29308}"/>
+              </a:ext>
+            </a:extLst>
+          </p:cNvPr>
+          <p:cNvSpPr txBox="1"/>
+          <p:nvPr/>
+        </p:nvSpPr>
+        <p:spPr>
+          <a:xfrm rot="18967554">
+            <a:off x="9859802" y="5418927"/>
+            <a:ext cx="1474634" cy="369332"/>
+          </a:xfrm>
+          <a:prstGeom prst="rect">
+            <a:avLst/>
+          </a:prstGeom>
+          <a:noFill/>
+        </p:spPr>
+        <p:txBody>
+          <a:bodyPr wrap="none" rtlCol="0">
+            <a:spAutoFit/>
+          </a:bodyPr>
+          <a:lstStyle/>
+          <a:p>
+            <a:pPr algn="ctr"/>
+            <a:r>
+              <a:rPr lang="en-US" dirty="0">
+                <a:solidFill>
+                  <a:schemeClr val="bg1"/>
+                </a:solidFill>
+              </a:rPr>
+              <a:t>Infrastructure</a:t>
+            </a:r>
+          </a:p>
+        </p:txBody>
+      </p:sp>
+      <p:sp>
+        <p:nvSpPr>
+          <p:cNvPr id="18" name="Arrow: Right 17">
+            <a:extLst>
+              <a:ext uri="{FF2B5EF4-FFF2-40B4-BE49-F238E27FC236}">
+                <a16:creationId xmlns:a16="http://schemas.microsoft.com/office/drawing/2014/main" id="{852F9670-D6FE-40E6-A3ED-7ED09F34CCDA}"/>
+              </a:ext>
+            </a:extLst>
+          </p:cNvPr>
+          <p:cNvSpPr/>
+          <p:nvPr/>
+        </p:nvSpPr>
+        <p:spPr>
+          <a:xfrm rot="5400000">
+            <a:off x="8892048" y="3167342"/>
+            <a:ext cx="369332" cy="291080"/>
+          </a:xfrm>
+          <a:prstGeom prst="rightArrow">
+            <a:avLst/>
+          </a:prstGeom>
+          <a:solidFill>
+            <a:schemeClr val="bg2">
+              <a:lumMod val="75000"/>
+            </a:schemeClr>
+          </a:solidFill>
+        </p:spPr>
+        <p:style>
+          <a:lnRef idx="2">
+            <a:schemeClr val="accent1">
+              <a:shade val="50000"/>
+            </a:schemeClr>
+          </a:lnRef>
+          <a:fillRef idx="1">
+            <a:schemeClr val="accent1"/>
+          </a:fillRef>
+          <a:effectRef idx="0">
+            <a:schemeClr val="accent1"/>
+          </a:effectRef>
+          <a:fontRef idx="minor">
+            <a:schemeClr val="lt1"/>
+          </a:fontRef>
+        </p:style>
+        <p:txBody>
+          <a:bodyPr rtlCol="0" anchor="ctr"/>
+          <a:lstStyle/>
+          <a:p>
+            <a:pPr algn="ctr"/>
+            <a:endParaRPr lang="en-US"/>
+          </a:p>
+        </p:txBody>
+      </p:sp>
+      <p:sp>
+        <p:nvSpPr>
+          <p:cNvPr id="19" name="Arrow: Right 18">
+            <a:extLst>
+              <a:ext uri="{FF2B5EF4-FFF2-40B4-BE49-F238E27FC236}">
+                <a16:creationId xmlns:a16="http://schemas.microsoft.com/office/drawing/2014/main" id="{A3559769-707F-409E-A0B6-3F1C187DA4F7}"/>
+              </a:ext>
+            </a:extLst>
+          </p:cNvPr>
+          <p:cNvSpPr/>
+          <p:nvPr/>
+        </p:nvSpPr>
+        <p:spPr>
+          <a:xfrm rot="5400000">
+            <a:off x="8899102" y="2424017"/>
+            <a:ext cx="369332" cy="291080"/>
+          </a:xfrm>
+          <a:prstGeom prst="rightArrow">
+            <a:avLst/>
+          </a:prstGeom>
+          <a:solidFill>
+            <a:schemeClr val="bg2">
+              <a:lumMod val="75000"/>
+            </a:schemeClr>
+          </a:solidFill>
+        </p:spPr>
+        <p:style>
+          <a:lnRef idx="2">
+            <a:schemeClr val="accent1">
+              <a:shade val="50000"/>
+            </a:schemeClr>
+          </a:lnRef>
+          <a:fillRef idx="1">
+            <a:schemeClr val="accent1"/>
+          </a:fillRef>
+          <a:effectRef idx="0">
+            <a:schemeClr val="accent1"/>
+          </a:effectRef>
+          <a:fontRef idx="minor">
+            <a:schemeClr val="lt1"/>
+          </a:fontRef>
+        </p:style>
+        <p:txBody>
+          <a:bodyPr rtlCol="0" anchor="ctr"/>
+          <a:lstStyle/>
+          <a:p>
+            <a:pPr algn="ctr"/>
+            <a:endParaRPr lang="en-US"/>
+          </a:p>
+        </p:txBody>
+      </p:sp>
+      <p:sp>
+        <p:nvSpPr>
+          <p:cNvPr id="20" name="Arrow: Right 19">
+            <a:extLst>
+              <a:ext uri="{FF2B5EF4-FFF2-40B4-BE49-F238E27FC236}">
+                <a16:creationId xmlns:a16="http://schemas.microsoft.com/office/drawing/2014/main" id="{8FE53732-9890-4E69-9CE7-639F26043EB9}"/>
+              </a:ext>
+            </a:extLst>
+          </p:cNvPr>
+          <p:cNvSpPr/>
+          <p:nvPr/>
+        </p:nvSpPr>
+        <p:spPr>
+          <a:xfrm rot="18900000">
+            <a:off x="7635384" y="5265564"/>
+            <a:ext cx="369332" cy="291080"/>
+          </a:xfrm>
+          <a:prstGeom prst="rightArrow">
+            <a:avLst/>
+          </a:prstGeom>
+          <a:solidFill>
+            <a:schemeClr val="bg2">
+              <a:lumMod val="75000"/>
+            </a:schemeClr>
+          </a:solidFill>
+        </p:spPr>
+        <p:style>
+          <a:lnRef idx="2">
+            <a:schemeClr val="accent1">
+              <a:shade val="50000"/>
+            </a:schemeClr>
+          </a:lnRef>
+          <a:fillRef idx="1">
+            <a:schemeClr val="accent1"/>
+          </a:fillRef>
+          <a:effectRef idx="0">
+            <a:schemeClr val="accent1"/>
+          </a:effectRef>
+          <a:fontRef idx="minor">
+            <a:schemeClr val="lt1"/>
+          </a:fontRef>
+        </p:style>
+        <p:txBody>
+          <a:bodyPr rtlCol="0" anchor="ctr"/>
+          <a:lstStyle/>
+          <a:p>
+            <a:pPr algn="ctr"/>
+            <a:endParaRPr lang="en-US"/>
+          </a:p>
+        </p:txBody>
+      </p:sp>
+      <p:sp>
+        <p:nvSpPr>
+          <p:cNvPr id="21" name="Arrow: Right 20">
+            <a:extLst>
+              <a:ext uri="{FF2B5EF4-FFF2-40B4-BE49-F238E27FC236}">
+                <a16:creationId xmlns:a16="http://schemas.microsoft.com/office/drawing/2014/main" id="{AC3EC937-3D1B-4783-949A-3C146E028367}"/>
+              </a:ext>
+            </a:extLst>
+          </p:cNvPr>
+          <p:cNvSpPr/>
+          <p:nvPr/>
+        </p:nvSpPr>
+        <p:spPr>
+          <a:xfrm rot="13500000">
+            <a:off x="10182265" y="5265564"/>
+            <a:ext cx="369332" cy="291080"/>
+          </a:xfrm>
+          <a:prstGeom prst="rightArrow">
+            <a:avLst/>
+          </a:prstGeom>
+          <a:solidFill>
+            <a:schemeClr val="bg2">
+              <a:lumMod val="75000"/>
+            </a:schemeClr>
+          </a:solidFill>
+        </p:spPr>
+        <p:style>
+          <a:lnRef idx="2">
+            <a:schemeClr val="accent1">
+              <a:shade val="50000"/>
+            </a:schemeClr>
+          </a:lnRef>
+          <a:fillRef idx="1">
+            <a:schemeClr val="accent1"/>
+          </a:fillRef>
+          <a:effectRef idx="0">
+            <a:schemeClr val="accent1"/>
+          </a:effectRef>
+          <a:fontRef idx="minor">
+            <a:schemeClr val="lt1"/>
+          </a:fontRef>
+        </p:style>
+        <p:txBody>
+          <a:bodyPr rtlCol="0" anchor="ctr"/>
+          <a:lstStyle/>
+          <a:p>
+            <a:pPr algn="ctr"/>
+            <a:endParaRPr lang="en-US"/>
+          </a:p>
+        </p:txBody>
+      </p:sp>
+      <p:sp>
+        <p:nvSpPr>
+          <p:cNvPr id="28" name="Content Placeholder 2">
+            <a:extLst>
+              <a:ext uri="{FF2B5EF4-FFF2-40B4-BE49-F238E27FC236}">
+                <a16:creationId xmlns:a16="http://schemas.microsoft.com/office/drawing/2014/main" id="{77BDCD5C-E1B5-4726-98B6-2BEE2675C06C}"/>
+              </a:ext>
+            </a:extLst>
+          </p:cNvPr>
+          <p:cNvSpPr txBox="1">
+            <a:spLocks/>
+          </p:cNvSpPr>
+          <p:nvPr/>
+        </p:nvSpPr>
+        <p:spPr>
+          <a:xfrm>
+            <a:off x="838200" y="1822067"/>
+            <a:ext cx="5181600" cy="4351338"/>
+          </a:xfrm>
+          <a:prstGeom prst="rect">
+            <a:avLst/>
+          </a:prstGeom>
+        </p:spPr>
+        <p:txBody>
+          <a:bodyPr vert="horz" lIns="91440" tIns="45720" rIns="91440" bIns="45720" rtlCol="0">
+            <a:normAutofit/>
+          </a:bodyPr>
+          <a:lstStyle>
+            <a:lvl1pPr marL="228600" indent="-228600" algn="l" defTabSz="914400" rtl="0" eaLnBrk="1" latinLnBrk="0" hangingPunct="1">
+              <a:lnSpc>
+                <a:spcPct val="90000"/>
+              </a:lnSpc>
+              <a:spcBef>
+                <a:spcPts val="1000"/>
+              </a:spcBef>
+              <a:buFont typeface="Arial" panose="020B0604020202020204" pitchFamily="34" charset="0"/>
+              <a:buChar char="•"/>
+              <a:defRPr sz="2800" kern="1200">
+                <a:solidFill>
+                  <a:schemeClr val="tx1"/>
+                </a:solidFill>
+                <a:latin typeface="+mn-lt"/>
+                <a:ea typeface="+mn-ea"/>
+                <a:cs typeface="+mn-cs"/>
+              </a:defRPr>
+            </a:lvl1pPr>
+            <a:lvl2pPr marL="685800" indent="-228600" algn="l" defTabSz="914400" rtl="0" eaLnBrk="1" latinLnBrk="0" hangingPunct="1">
+              <a:lnSpc>
+                <a:spcPct val="90000"/>
+              </a:lnSpc>
+              <a:spcBef>
+                <a:spcPts val="500"/>
+              </a:spcBef>
+              <a:buFont typeface="Arial" panose="020B0604020202020204" pitchFamily="34" charset="0"/>
+              <a:buChar char="•"/>
+              <a:defRPr sz="2400" kern="1200">
+                <a:solidFill>
+                  <a:schemeClr val="tx1"/>
+                </a:solidFill>
+                <a:latin typeface="+mn-lt"/>
+                <a:ea typeface="+mn-ea"/>
+                <a:cs typeface="+mn-cs"/>
+              </a:defRPr>
+            </a:lvl2pPr>
+            <a:lvl3pPr marL="1143000" indent="-228600" algn="l" defTabSz="914400" rtl="0" eaLnBrk="1" latinLnBrk="0" hangingPunct="1">
+              <a:lnSpc>
+                <a:spcPct val="90000"/>
+              </a:lnSpc>
+              <a:spcBef>
+                <a:spcPts val="500"/>
+              </a:spcBef>
+              <a:buFont typeface="Arial" panose="020B0604020202020204" pitchFamily="34" charset="0"/>
+              <a:buChar char="•"/>
+              <a:defRPr sz="2000" kern="1200">
+                <a:solidFill>
+                  <a:schemeClr val="tx1"/>
+                </a:solidFill>
+                <a:latin typeface="+mn-lt"/>
+                <a:ea typeface="+mn-ea"/>
+                <a:cs typeface="+mn-cs"/>
+              </a:defRPr>
+            </a:lvl3pPr>
+            <a:lvl4pPr marL="1600200" indent="-228600" algn="l" defTabSz="914400" rtl="0" eaLnBrk="1" latinLnBrk="0" hangingPunct="1">
+              <a:lnSpc>
+                <a:spcPct val="90000"/>
+              </a:lnSpc>
+              <a:spcBef>
+                <a:spcPts val="500"/>
+              </a:spcBef>
+              <a:buFont typeface="Arial" panose="020B0604020202020204" pitchFamily="34" charset="0"/>
+              <a:buChar char="•"/>
+              <a:defRPr sz="1800" kern="1200">
+                <a:solidFill>
+                  <a:schemeClr val="tx1"/>
+                </a:solidFill>
+                <a:latin typeface="+mn-lt"/>
+                <a:ea typeface="+mn-ea"/>
+                <a:cs typeface="+mn-cs"/>
+              </a:defRPr>
+            </a:lvl4pPr>
+            <a:lvl5pPr marL="2057400" indent="-228600" algn="l" defTabSz="914400" rtl="0" eaLnBrk="1" latinLnBrk="0" hangingPunct="1">
+              <a:lnSpc>
+                <a:spcPct val="90000"/>
+              </a:lnSpc>
+              <a:spcBef>
+                <a:spcPts val="500"/>
+              </a:spcBef>
+              <a:buFont typeface="Arial" panose="020B0604020202020204" pitchFamily="34" charset="0"/>
+              <a:buChar char="•"/>
+              <a:defRPr sz="1800" kern="1200">
+                <a:solidFill>
+                  <a:schemeClr val="tx1"/>
+                </a:solidFill>
+                <a:latin typeface="+mn-lt"/>
+                <a:ea typeface="+mn-ea"/>
+                <a:cs typeface="+mn-cs"/>
+              </a:defRPr>
+            </a:lvl5pPr>
+            <a:lvl6pPr marL="2514600" indent="-228600" algn="l" defTabSz="914400" rtl="0" eaLnBrk="1" latinLnBrk="0" hangingPunct="1">
+              <a:lnSpc>
+                <a:spcPct val="90000"/>
+              </a:lnSpc>
+              <a:spcBef>
+                <a:spcPts val="500"/>
+              </a:spcBef>
+              <a:buFont typeface="Arial" panose="020B0604020202020204" pitchFamily="34" charset="0"/>
+              <a:buChar char="•"/>
+              <a:defRPr sz="1800" kern="1200">
+                <a:solidFill>
+                  <a:schemeClr val="tx1"/>
+                </a:solidFill>
+                <a:latin typeface="+mn-lt"/>
+                <a:ea typeface="+mn-ea"/>
+                <a:cs typeface="+mn-cs"/>
+              </a:defRPr>
+            </a:lvl6pPr>
+            <a:lvl7pPr marL="2971800" indent="-228600" algn="l" defTabSz="914400" rtl="0" eaLnBrk="1" latinLnBrk="0" hangingPunct="1">
+              <a:lnSpc>
+                <a:spcPct val="90000"/>
+              </a:lnSpc>
+              <a:spcBef>
+                <a:spcPts val="500"/>
+              </a:spcBef>
+              <a:buFont typeface="Arial" panose="020B0604020202020204" pitchFamily="34" charset="0"/>
+              <a:buChar char="•"/>
+              <a:defRPr sz="1800" kern="1200">
+                <a:solidFill>
+                  <a:schemeClr val="tx1"/>
+                </a:solidFill>
+                <a:latin typeface="+mn-lt"/>
+                <a:ea typeface="+mn-ea"/>
+                <a:cs typeface="+mn-cs"/>
+              </a:defRPr>
+            </a:lvl7pPr>
+            <a:lvl8pPr marL="3429000" indent="-228600" algn="l" defTabSz="914400" rtl="0" eaLnBrk="1" latinLnBrk="0" hangingPunct="1">
+              <a:lnSpc>
+                <a:spcPct val="90000"/>
+              </a:lnSpc>
+              <a:spcBef>
+                <a:spcPts val="500"/>
+              </a:spcBef>
+              <a:buFont typeface="Arial" panose="020B0604020202020204" pitchFamily="34" charset="0"/>
+              <a:buChar char="•"/>
+              <a:defRPr sz="1800" kern="1200">
+                <a:solidFill>
+                  <a:schemeClr val="tx1"/>
+                </a:solidFill>
+                <a:latin typeface="+mn-lt"/>
+                <a:ea typeface="+mn-ea"/>
+                <a:cs typeface="+mn-cs"/>
+              </a:defRPr>
+            </a:lvl8pPr>
+            <a:lvl9pPr marL="3886200" indent="-228600" algn="l" defTabSz="914400" rtl="0" eaLnBrk="1" latinLnBrk="0" hangingPunct="1">
+              <a:lnSpc>
+                <a:spcPct val="90000"/>
+              </a:lnSpc>
+              <a:spcBef>
+                <a:spcPts val="500"/>
+              </a:spcBef>
+              <a:buFont typeface="Arial" panose="020B0604020202020204" pitchFamily="34" charset="0"/>
+              <a:buChar char="•"/>
+              <a:defRPr sz="1800" kern="1200">
+                <a:solidFill>
+                  <a:schemeClr val="tx1"/>
+                </a:solidFill>
+                <a:latin typeface="+mn-lt"/>
+                <a:ea typeface="+mn-ea"/>
+                <a:cs typeface="+mn-cs"/>
+              </a:defRPr>
+            </a:lvl9pPr>
+          </a:lstStyle>
+          <a:p>
+            <a:pPr marL="0" indent="0">
+              <a:buNone/>
+            </a:pPr>
+            <a:r>
+              <a:rPr lang="en-US" dirty="0" err="1"/>
+              <a:t>DbContext</a:t>
+            </a:r>
+            <a:r>
+              <a:rPr lang="en-US" dirty="0"/>
+              <a:t>, Repository, and Unit of Work Patterns</a:t>
+            </a:r>
+          </a:p>
+          <a:p>
+            <a:pPr marL="0" indent="0">
+              <a:buNone/>
+            </a:pPr>
+            <a:r>
+              <a:rPr lang="en-US" dirty="0"/>
+              <a:t>Conventions over configuration</a:t>
+            </a:r>
+          </a:p>
+          <a:p>
+            <a:pPr marL="0" indent="0">
+              <a:buNone/>
+            </a:pPr>
+            <a:r>
+              <a:rPr lang="en-US" dirty="0"/>
+              <a:t>Migrations</a:t>
+            </a:r>
+          </a:p>
+          <a:p>
+            <a:pPr marL="0" indent="0">
+              <a:buNone/>
+            </a:pPr>
+            <a:r>
+              <a:rPr lang="en-US" dirty="0"/>
+              <a:t>Seeding</a:t>
+            </a:r>
+          </a:p>
+          <a:p>
+            <a:pPr marL="0" indent="0">
+              <a:buNone/>
+            </a:pPr>
+            <a:r>
+              <a:rPr lang="en-US" dirty="0"/>
+              <a:t>Abstractions</a:t>
+            </a:r>
+          </a:p>
+          <a:p>
+            <a:pPr marL="0" indent="0">
+              <a:buNone/>
+            </a:pPr>
+            <a:endParaRPr lang="en-US" dirty="0"/>
+          </a:p>
+        </p:txBody>
+      </p:sp>
+    </p:spTree>
+    <p:extLst>
+      <p:ext uri="{BB962C8B-B14F-4D97-AF65-F5344CB8AC3E}">
+        <p14:creationId xmlns:p14="http://schemas.microsoft.com/office/powerpoint/2010/main" val="675333694"/>
+      </p:ext>
+    </p:extLst>
+  </p:cSld>
+  <p:clrMapOvr>
+    <a:masterClrMapping/>
+  </p:clrMapOvr>
+  <p:timing>
+    <p:tnLst>
+      <p:par>
+        <p:cTn id="1" dur="indefinite" restart="never" nodeType="tmRoot">
+          <p:childTnLst>
+            <p:seq concurrent="1" nextAc="seek">
+              <p:cTn id="2" dur="indefinite" nodeType="mainSeq">
+                <p:childTnLst>
+                  <p:par>
+                    <p:cTn id="3" fill="hold">
+                      <p:stCondLst>
+                        <p:cond delay="indefinite"/>
+                      </p:stCondLst>
+                      <p:childTnLst>
+                        <p:par>
+                          <p:cTn id="4" fill="hold">
+                            <p:stCondLst>
+                              <p:cond delay="0"/>
+                            </p:stCondLst>
+                            <p:childTnLst>
+                              <p:par>
+                                <p:cTn id="5" presetID="2" presetClass="entr" presetSubtype="4" fill="hold" grpId="0" nodeType="clickEffect">
+                                  <p:stCondLst>
+                                    <p:cond delay="0"/>
+                                  </p:stCondLst>
+                                  <p:childTnLst>
+                                    <p:set>
+                                      <p:cBhvr>
+                                        <p:cTn id="6" dur="1" fill="hold">
+                                          <p:stCondLst>
+                                            <p:cond delay="0"/>
+                                          </p:stCondLst>
+                                        </p:cTn>
+                                        <p:tgtEl>
+                                          <p:spTgt spid="28">
+                                            <p:txEl>
+                                              <p:pRg st="0" end="0"/>
+                                            </p:txEl>
+                                          </p:spTgt>
+                                        </p:tgtEl>
+                                        <p:attrNameLst>
+                                          <p:attrName>style.visibility</p:attrName>
+                                        </p:attrNameLst>
+                                      </p:cBhvr>
+                                      <p:to>
+                                        <p:strVal val="visible"/>
+                                      </p:to>
+                                    </p:set>
+                                    <p:anim calcmode="lin" valueType="num">
+                                      <p:cBhvr additive="base">
+                                        <p:cTn id="7" dur="500" fill="hold"/>
+                                        <p:tgtEl>
+                                          <p:spTgt spid="28">
+                                            <p:txEl>
+                                              <p:pRg st="0" end="0"/>
+                                            </p:txEl>
+                                          </p:spTgt>
+                                        </p:tgtEl>
+                                        <p:attrNameLst>
+                                          <p:attrName>ppt_x</p:attrName>
+                                        </p:attrNameLst>
+                                      </p:cBhvr>
+                                      <p:tavLst>
+                                        <p:tav tm="0">
+                                          <p:val>
+                                            <p:strVal val="#ppt_x"/>
+                                          </p:val>
+                                        </p:tav>
+                                        <p:tav tm="100000">
+                                          <p:val>
+                                            <p:strVal val="#ppt_x"/>
+                                          </p:val>
+                                        </p:tav>
+                                      </p:tavLst>
+                                    </p:anim>
+                                    <p:anim calcmode="lin" valueType="num">
+                                      <p:cBhvr additive="base">
+                                        <p:cTn id="8" dur="500" fill="hold"/>
+                                        <p:tgtEl>
+                                          <p:spTgt spid="28">
+                                            <p:txEl>
+                                              <p:pRg st="0" end="0"/>
+                                            </p:txEl>
+                                          </p:spTgt>
+                                        </p:tgtEl>
+                                        <p:attrNameLst>
+                                          <p:attrName>ppt_y</p:attrName>
+                                        </p:attrNameLst>
+                                      </p:cBhvr>
+                                      <p:tavLst>
+                                        <p:tav tm="0">
+                                          <p:val>
+                                            <p:strVal val="1+#ppt_h/2"/>
+                                          </p:val>
+                                        </p:tav>
+                                        <p:tav tm="100000">
+                                          <p:val>
+                                            <p:strVal val="#ppt_y"/>
+                                          </p:val>
+                                        </p:tav>
+                                      </p:tavLst>
+                                    </p:anim>
+                                  </p:childTnLst>
+                                </p:cTn>
+                              </p:par>
+                            </p:childTnLst>
+                          </p:cTn>
+                        </p:par>
+                      </p:childTnLst>
+                    </p:cTn>
+                  </p:par>
+                  <p:par>
+                    <p:cTn id="9" fill="hold">
+                      <p:stCondLst>
+                        <p:cond delay="indefinite"/>
+                      </p:stCondLst>
+                      <p:childTnLst>
+                        <p:par>
+                          <p:cTn id="10" fill="hold">
+                            <p:stCondLst>
+                              <p:cond delay="0"/>
+                            </p:stCondLst>
+                            <p:childTnLst>
+                              <p:par>
+                                <p:cTn id="11" presetID="2" presetClass="entr" presetSubtype="4" fill="hold" grpId="0" nodeType="clickEffect">
+                                  <p:stCondLst>
+                                    <p:cond delay="0"/>
+                                  </p:stCondLst>
+                                  <p:childTnLst>
+                                    <p:set>
+                                      <p:cBhvr>
+                                        <p:cTn id="12" dur="1" fill="hold">
+                                          <p:stCondLst>
+                                            <p:cond delay="0"/>
+                                          </p:stCondLst>
+                                        </p:cTn>
+                                        <p:tgtEl>
+                                          <p:spTgt spid="28">
+                                            <p:txEl>
+                                              <p:pRg st="1" end="1"/>
+                                            </p:txEl>
+                                          </p:spTgt>
+                                        </p:tgtEl>
+                                        <p:attrNameLst>
+                                          <p:attrName>style.visibility</p:attrName>
+                                        </p:attrNameLst>
+                                      </p:cBhvr>
+                                      <p:to>
+                                        <p:strVal val="visible"/>
+                                      </p:to>
+                                    </p:set>
+                                    <p:anim calcmode="lin" valueType="num">
+                                      <p:cBhvr additive="base">
+                                        <p:cTn id="13" dur="500" fill="hold"/>
+                                        <p:tgtEl>
+                                          <p:spTgt spid="28">
+                                            <p:txEl>
+                                              <p:pRg st="1" end="1"/>
+                                            </p:txEl>
+                                          </p:spTgt>
+                                        </p:tgtEl>
+                                        <p:attrNameLst>
+                                          <p:attrName>ppt_x</p:attrName>
+                                        </p:attrNameLst>
+                                      </p:cBhvr>
+                                      <p:tavLst>
+                                        <p:tav tm="0">
+                                          <p:val>
+                                            <p:strVal val="#ppt_x"/>
+                                          </p:val>
+                                        </p:tav>
+                                        <p:tav tm="100000">
+                                          <p:val>
+                                            <p:strVal val="#ppt_x"/>
+                                          </p:val>
+                                        </p:tav>
+                                      </p:tavLst>
+                                    </p:anim>
+                                    <p:anim calcmode="lin" valueType="num">
+                                      <p:cBhvr additive="base">
+                                        <p:cTn id="14" dur="500" fill="hold"/>
+                                        <p:tgtEl>
+                                          <p:spTgt spid="28">
+                                            <p:txEl>
+                                              <p:pRg st="1" end="1"/>
+                                            </p:txEl>
+                                          </p:spTgt>
+                                        </p:tgtEl>
+                                        <p:attrNameLst>
+                                          <p:attrName>ppt_y</p:attrName>
+                                        </p:attrNameLst>
+                                      </p:cBhvr>
+                                      <p:tavLst>
+                                        <p:tav tm="0">
+                                          <p:val>
+                                            <p:strVal val="1+#ppt_h/2"/>
+                                          </p:val>
+                                        </p:tav>
+                                        <p:tav tm="100000">
+                                          <p:val>
+                                            <p:strVal val="#ppt_y"/>
+                                          </p:val>
+                                        </p:tav>
+                                      </p:tavLst>
+                                    </p:anim>
+                                  </p:childTnLst>
+                                </p:cTn>
+                              </p:par>
+                            </p:childTnLst>
+                          </p:cTn>
+                        </p:par>
+                      </p:childTnLst>
+                    </p:cTn>
+                  </p:par>
+                  <p:par>
+                    <p:cTn id="15" fill="hold">
+                      <p:stCondLst>
+                        <p:cond delay="indefinite"/>
+                      </p:stCondLst>
+                      <p:childTnLst>
+                        <p:par>
+                          <p:cTn id="16" fill="hold">
+                            <p:stCondLst>
+                              <p:cond delay="0"/>
+                            </p:stCondLst>
+                            <p:childTnLst>
+                              <p:par>
+                                <p:cTn id="17" presetID="2" presetClass="entr" presetSubtype="4" fill="hold" grpId="0" nodeType="clickEffect">
+                                  <p:stCondLst>
+                                    <p:cond delay="0"/>
+                                  </p:stCondLst>
+                                  <p:childTnLst>
+                                    <p:set>
+                                      <p:cBhvr>
+                                        <p:cTn id="18" dur="1" fill="hold">
+                                          <p:stCondLst>
+                                            <p:cond delay="0"/>
+                                          </p:stCondLst>
+                                        </p:cTn>
+                                        <p:tgtEl>
+                                          <p:spTgt spid="28">
+                                            <p:txEl>
+                                              <p:pRg st="2" end="2"/>
+                                            </p:txEl>
+                                          </p:spTgt>
+                                        </p:tgtEl>
+                                        <p:attrNameLst>
+                                          <p:attrName>style.visibility</p:attrName>
+                                        </p:attrNameLst>
+                                      </p:cBhvr>
+                                      <p:to>
+                                        <p:strVal val="visible"/>
+                                      </p:to>
+                                    </p:set>
+                                    <p:anim calcmode="lin" valueType="num">
+                                      <p:cBhvr additive="base">
+                                        <p:cTn id="19" dur="500" fill="hold"/>
+                                        <p:tgtEl>
+                                          <p:spTgt spid="28">
+                                            <p:txEl>
+                                              <p:pRg st="2" end="2"/>
+                                            </p:txEl>
+                                          </p:spTgt>
+                                        </p:tgtEl>
+                                        <p:attrNameLst>
+                                          <p:attrName>ppt_x</p:attrName>
+                                        </p:attrNameLst>
+                                      </p:cBhvr>
+                                      <p:tavLst>
+                                        <p:tav tm="0">
+                                          <p:val>
+                                            <p:strVal val="#ppt_x"/>
+                                          </p:val>
+                                        </p:tav>
+                                        <p:tav tm="100000">
+                                          <p:val>
+                                            <p:strVal val="#ppt_x"/>
+                                          </p:val>
+                                        </p:tav>
+                                      </p:tavLst>
+                                    </p:anim>
+                                    <p:anim calcmode="lin" valueType="num">
+                                      <p:cBhvr additive="base">
+                                        <p:cTn id="20" dur="500" fill="hold"/>
+                                        <p:tgtEl>
+                                          <p:spTgt spid="28">
+                                            <p:txEl>
+                                              <p:pRg st="2" end="2"/>
+                                            </p:txEl>
+                                          </p:spTgt>
+                                        </p:tgtEl>
+                                        <p:attrNameLst>
+                                          <p:attrName>ppt_y</p:attrName>
+                                        </p:attrNameLst>
+                                      </p:cBhvr>
+                                      <p:tavLst>
+                                        <p:tav tm="0">
+                                          <p:val>
+                                            <p:strVal val="1+#ppt_h/2"/>
+                                          </p:val>
+                                        </p:tav>
+                                        <p:tav tm="100000">
+                                          <p:val>
+                                            <p:strVal val="#ppt_y"/>
+                                          </p:val>
+                                        </p:tav>
+                                      </p:tavLst>
+                                    </p:anim>
+                                  </p:childTnLst>
+                                </p:cTn>
+                              </p:par>
+                            </p:childTnLst>
+                          </p:cTn>
+                        </p:par>
+                      </p:childTnLst>
+                    </p:cTn>
+                  </p:par>
+                  <p:par>
+                    <p:cTn id="21" fill="hold">
+                      <p:stCondLst>
+                        <p:cond delay="indefinite"/>
+                      </p:stCondLst>
+                      <p:childTnLst>
+                        <p:par>
+                          <p:cTn id="22" fill="hold">
+                            <p:stCondLst>
+                              <p:cond delay="0"/>
+                            </p:stCondLst>
+                            <p:childTnLst>
+                              <p:par>
+                                <p:cTn id="23" presetID="2" presetClass="entr" presetSubtype="4" fill="hold" grpId="0" nodeType="clickEffect">
+                                  <p:stCondLst>
+                                    <p:cond delay="0"/>
+                                  </p:stCondLst>
+                                  <p:childTnLst>
+                                    <p:set>
+                                      <p:cBhvr>
+                                        <p:cTn id="24" dur="1" fill="hold">
+                                          <p:stCondLst>
+                                            <p:cond delay="0"/>
+                                          </p:stCondLst>
+                                        </p:cTn>
+                                        <p:tgtEl>
+                                          <p:spTgt spid="28">
+                                            <p:txEl>
+                                              <p:pRg st="3" end="3"/>
+                                            </p:txEl>
+                                          </p:spTgt>
+                                        </p:tgtEl>
+                                        <p:attrNameLst>
+                                          <p:attrName>style.visibility</p:attrName>
+                                        </p:attrNameLst>
+                                      </p:cBhvr>
+                                      <p:to>
+                                        <p:strVal val="visible"/>
+                                      </p:to>
+                                    </p:set>
+                                    <p:anim calcmode="lin" valueType="num">
+                                      <p:cBhvr additive="base">
+                                        <p:cTn id="25" dur="500" fill="hold"/>
+                                        <p:tgtEl>
+                                          <p:spTgt spid="28">
+                                            <p:txEl>
+                                              <p:pRg st="3" end="3"/>
+                                            </p:txEl>
+                                          </p:spTgt>
+                                        </p:tgtEl>
+                                        <p:attrNameLst>
+                                          <p:attrName>ppt_x</p:attrName>
+                                        </p:attrNameLst>
+                                      </p:cBhvr>
+                                      <p:tavLst>
+                                        <p:tav tm="0">
+                                          <p:val>
+                                            <p:strVal val="#ppt_x"/>
+                                          </p:val>
+                                        </p:tav>
+                                        <p:tav tm="100000">
+                                          <p:val>
+                                            <p:strVal val="#ppt_x"/>
+                                          </p:val>
+                                        </p:tav>
+                                      </p:tavLst>
+                                    </p:anim>
+                                    <p:anim calcmode="lin" valueType="num">
+                                      <p:cBhvr additive="base">
+                                        <p:cTn id="26" dur="500" fill="hold"/>
+                                        <p:tgtEl>
+                                          <p:spTgt spid="28">
+                                            <p:txEl>
+                                              <p:pRg st="3" end="3"/>
+                                            </p:txEl>
+                                          </p:spTgt>
+                                        </p:tgtEl>
+                                        <p:attrNameLst>
+                                          <p:attrName>ppt_y</p:attrName>
+                                        </p:attrNameLst>
+                                      </p:cBhvr>
+                                      <p:tavLst>
+                                        <p:tav tm="0">
+                                          <p:val>
+                                            <p:strVal val="1+#ppt_h/2"/>
+                                          </p:val>
+                                        </p:tav>
+                                        <p:tav tm="100000">
+                                          <p:val>
+                                            <p:strVal val="#ppt_y"/>
+                                          </p:val>
+                                        </p:tav>
+                                      </p:tavLst>
+                                    </p:anim>
+                                  </p:childTnLst>
+                                </p:cTn>
+                              </p:par>
+                            </p:childTnLst>
+                          </p:cTn>
+                        </p:par>
+                      </p:childTnLst>
+                    </p:cTn>
+                  </p:par>
+                  <p:par>
+                    <p:cTn id="27" fill="hold">
+                      <p:stCondLst>
+                        <p:cond delay="indefinite"/>
+                      </p:stCondLst>
+                      <p:childTnLst>
+                        <p:par>
+                          <p:cTn id="28" fill="hold">
+                            <p:stCondLst>
+                              <p:cond delay="0"/>
+                            </p:stCondLst>
+                            <p:childTnLst>
+                              <p:par>
+                                <p:cTn id="29" presetID="2" presetClass="entr" presetSubtype="4" fill="hold" grpId="0" nodeType="clickEffect">
+                                  <p:stCondLst>
+                                    <p:cond delay="0"/>
+                                  </p:stCondLst>
+                                  <p:childTnLst>
+                                    <p:set>
+                                      <p:cBhvr>
+                                        <p:cTn id="30" dur="1" fill="hold">
+                                          <p:stCondLst>
+                                            <p:cond delay="0"/>
+                                          </p:stCondLst>
+                                        </p:cTn>
+                                        <p:tgtEl>
+                                          <p:spTgt spid="28">
+                                            <p:txEl>
+                                              <p:pRg st="4" end="4"/>
+                                            </p:txEl>
+                                          </p:spTgt>
+                                        </p:tgtEl>
+                                        <p:attrNameLst>
+                                          <p:attrName>style.visibility</p:attrName>
+                                        </p:attrNameLst>
+                                      </p:cBhvr>
+                                      <p:to>
+                                        <p:strVal val="visible"/>
+                                      </p:to>
+                                    </p:set>
+                                    <p:anim calcmode="lin" valueType="num">
+                                      <p:cBhvr additive="base">
+                                        <p:cTn id="31" dur="500" fill="hold"/>
+                                        <p:tgtEl>
+                                          <p:spTgt spid="28">
+                                            <p:txEl>
+                                              <p:pRg st="4" end="4"/>
+                                            </p:txEl>
+                                          </p:spTgt>
+                                        </p:tgtEl>
+                                        <p:attrNameLst>
+                                          <p:attrName>ppt_x</p:attrName>
+                                        </p:attrNameLst>
+                                      </p:cBhvr>
+                                      <p:tavLst>
+                                        <p:tav tm="0">
+                                          <p:val>
+                                            <p:strVal val="#ppt_x"/>
+                                          </p:val>
+                                        </p:tav>
+                                        <p:tav tm="100000">
+                                          <p:val>
+                                            <p:strVal val="#ppt_x"/>
+                                          </p:val>
+                                        </p:tav>
+                                      </p:tavLst>
+                                    </p:anim>
+                                    <p:anim calcmode="lin" valueType="num">
+                                      <p:cBhvr additive="base">
+                                        <p:cTn id="32" dur="500" fill="hold"/>
+                                        <p:tgtEl>
+                                          <p:spTgt spid="28">
+                                            <p:txEl>
+                                              <p:pRg st="4" end="4"/>
+                                            </p:txEl>
+                                          </p:spTgt>
+                                        </p:tgtEl>
+                                        <p:attrNameLst>
+                                          <p:attrName>ppt_y</p:attrName>
+                                        </p:attrNameLst>
+                                      </p:cBhvr>
+                                      <p:tavLst>
+                                        <p:tav tm="0">
+                                          <p:val>
+                                            <p:strVal val="1+#ppt_h/2"/>
+                                          </p:val>
+                                        </p:tav>
+                                        <p:tav tm="100000">
+                                          <p:val>
+                                            <p:strVal val="#ppt_y"/>
+                                          </p:val>
+                                        </p:tav>
+                                      </p:tavLst>
+                                    </p:anim>
+                                  </p:childTnLst>
+                                </p:cTn>
+                              </p:par>
+                            </p:childTnLst>
+                          </p:cTn>
+                        </p:par>
+                      </p:childTnLst>
+                    </p:cTn>
+                  </p:par>
+                </p:childTnLst>
+              </p:cTn>
+              <p:prevCondLst>
+                <p:cond evt="onPrev" delay="0">
+                  <p:tgtEl>
+                    <p:sldTgt/>
+                  </p:tgtEl>
+                </p:cond>
+              </p:prevCondLst>
+              <p:nextCondLst>
+                <p:cond evt="onNext" delay="0">
+                  <p:tgtEl>
+                    <p:sldTgt/>
+                  </p:tgtEl>
+                </p:cond>
+              </p:nextCondLst>
+            </p:seq>
+          </p:childTnLst>
+        </p:cTn>
+      </p:par>
+    </p:tnLst>
+    <p:bldLst>
+      <p:bldP spid="28" grpId="0" build="p"/>
+    </p:bldLst>
+  </p:timing>
+</p:sld>
+</file>
+
+<file path=ppt/slides/slide15.xml><?xml version="1.0" encoding="utf-8"?>
+<p:sld xmlns:a="http://schemas.openxmlformats.org/drawingml/2006/main" xmlns:r="http://schemas.openxmlformats.org/officeDocument/2006/relationships" xmlns:p="http://schemas.openxmlformats.org/presentationml/2006/main">
+  <p:cSld>
+    <p:spTree>
+      <p:nvGrpSpPr>
+        <p:cNvPr id="1" name=""/>
+        <p:cNvGrpSpPr/>
+        <p:nvPr/>
+      </p:nvGrpSpPr>
+      <p:grpSpPr>
+        <a:xfrm>
+          <a:off x="0" y="0"/>
+          <a:ext cx="0" cy="0"/>
+          <a:chOff x="0" y="0"/>
+          <a:chExt cx="0" cy="0"/>
+        </a:xfrm>
+      </p:grpSpPr>
+      <p:sp>
+        <p:nvSpPr>
+          <p:cNvPr id="2" name="Title 1">
+            <a:extLst>
+              <a:ext uri="{FF2B5EF4-FFF2-40B4-BE49-F238E27FC236}">
+                <a16:creationId xmlns:a16="http://schemas.microsoft.com/office/drawing/2014/main" id="{33F2D5BF-881E-4E06-A466-2F7EED5050AA}"/>
+              </a:ext>
+            </a:extLst>
+          </p:cNvPr>
+          <p:cNvSpPr>
+            <a:spLocks noGrp="1"/>
+          </p:cNvSpPr>
+          <p:nvPr>
+            <p:ph type="title"/>
+          </p:nvPr>
+        </p:nvSpPr>
+        <p:spPr/>
+        <p:txBody>
+          <a:bodyPr/>
+          <a:lstStyle/>
+          <a:p>
+            <a:r>
+              <a:rPr lang="en-US" dirty="0"/>
+              <a:t>Unit of Work and Repository Patterns</a:t>
+            </a:r>
+          </a:p>
+        </p:txBody>
+      </p:sp>
+      <p:sp>
+        <p:nvSpPr>
+          <p:cNvPr id="3" name="Content Placeholder 2">
+            <a:extLst>
+              <a:ext uri="{FF2B5EF4-FFF2-40B4-BE49-F238E27FC236}">
+                <a16:creationId xmlns:a16="http://schemas.microsoft.com/office/drawing/2014/main" id="{92831B7E-3386-4972-9FEA-8B0BAC192E33}"/>
+              </a:ext>
+            </a:extLst>
+          </p:cNvPr>
+          <p:cNvSpPr>
+            <a:spLocks noGrp="1"/>
+          </p:cNvSpPr>
+          <p:nvPr>
+            <p:ph idx="1"/>
+          </p:nvPr>
+        </p:nvSpPr>
+        <p:spPr/>
+        <p:txBody>
+          <a:bodyPr>
+            <a:normAutofit/>
+          </a:bodyPr>
+          <a:lstStyle/>
+          <a:p>
+            <a:pPr marL="0" indent="0">
+              <a:buNone/>
+            </a:pPr>
+            <a:r>
+              <a:rPr lang="en-US" dirty="0"/>
+              <a:t>Should we implement these patterns?</a:t>
+            </a:r>
+          </a:p>
+          <a:p>
+            <a:pPr marL="0" indent="0">
+              <a:buNone/>
+            </a:pPr>
+            <a:r>
+              <a:rPr lang="en-US" dirty="0"/>
+              <a:t>It isn’t always the best choice, because:</a:t>
+            </a:r>
+          </a:p>
+          <a:p>
+            <a:r>
+              <a:rPr lang="en-US" dirty="0" err="1"/>
+              <a:t>DbContext</a:t>
+            </a:r>
+            <a:r>
+              <a:rPr lang="en-US" dirty="0"/>
+              <a:t> insulates your code from database changes</a:t>
+            </a:r>
+          </a:p>
+          <a:p>
+            <a:r>
+              <a:rPr lang="en-US" dirty="0" err="1"/>
+              <a:t>DbContext</a:t>
+            </a:r>
+            <a:r>
+              <a:rPr lang="en-US" dirty="0"/>
+              <a:t> acts as a unit of work</a:t>
+            </a:r>
+          </a:p>
+          <a:p>
+            <a:r>
+              <a:rPr lang="en-US" dirty="0" err="1"/>
+              <a:t>DbSet</a:t>
+            </a:r>
+            <a:r>
+              <a:rPr lang="en-US" dirty="0"/>
+              <a:t> acts as a repository</a:t>
+            </a:r>
+          </a:p>
+          <a:p>
+            <a:r>
+              <a:rPr lang="en-US" dirty="0"/>
+              <a:t>EF Core has feature for unit testing without repositories</a:t>
+            </a:r>
+          </a:p>
+          <a:p>
+            <a:pPr marL="0" indent="0">
+              <a:buNone/>
+            </a:pPr>
+            <a:endParaRPr lang="en-US" dirty="0"/>
+          </a:p>
+          <a:p>
+            <a:pPr marL="0" indent="0">
+              <a:buNone/>
+            </a:pPr>
+            <a:r>
+              <a:rPr lang="en-US" dirty="0"/>
+              <a:t>However…</a:t>
+            </a:r>
+          </a:p>
+        </p:txBody>
+      </p:sp>
+    </p:spTree>
+    <p:extLst>
+      <p:ext uri="{BB962C8B-B14F-4D97-AF65-F5344CB8AC3E}">
+        <p14:creationId xmlns:p14="http://schemas.microsoft.com/office/powerpoint/2010/main" val="2302463419"/>
+      </p:ext>
+    </p:extLst>
+  </p:cSld>
+  <p:clrMapOvr>
+    <a:masterClrMapping/>
+  </p:clrMapOvr>
+  <p:timing>
+    <p:tnLst>
+      <p:par>
+        <p:cTn id="1" dur="indefinite" restart="never" nodeType="tmRoot">
+          <p:childTnLst>
+            <p:seq concurrent="1" nextAc="seek">
+              <p:cTn id="2" dur="indefinite" nodeType="mainSeq">
+                <p:childTnLst>
+                  <p:par>
+                    <p:cTn id="3" fill="hold">
+                      <p:stCondLst>
+                        <p:cond delay="indefinite"/>
+                      </p:stCondLst>
+                      <p:childTnLst>
+                        <p:par>
+                          <p:cTn id="4" fill="hold">
+                            <p:stCondLst>
+                              <p:cond delay="0"/>
+                            </p:stCondLst>
+                            <p:childTnLst>
+                              <p:par>
+                                <p:cTn id="5" presetID="2" presetClass="entr" presetSubtype="4" fill="hold" grpId="0" nodeType="clickEffect">
+                                  <p:stCondLst>
+                                    <p:cond delay="0"/>
+                                  </p:stCondLst>
+                                  <p:childTnLst>
+                                    <p:set>
+                                      <p:cBhvr>
+                                        <p:cTn id="6" dur="1" fill="hold">
+                                          <p:stCondLst>
+                                            <p:cond delay="0"/>
+                                          </p:stCondLst>
+                                        </p:cTn>
+                                        <p:tgtEl>
+                                          <p:spTgt spid="3">
+                                            <p:txEl>
+                                              <p:pRg st="0" end="0"/>
+                                            </p:txEl>
+                                          </p:spTgt>
+                                        </p:tgtEl>
+                                        <p:attrNameLst>
+                                          <p:attrName>style.visibility</p:attrName>
+                                        </p:attrNameLst>
+                                      </p:cBhvr>
+                                      <p:to>
+                                        <p:strVal val="visible"/>
+                                      </p:to>
+                                    </p:set>
+                                    <p:anim calcmode="lin" valueType="num">
+                                      <p:cBhvr additive="base">
+                                        <p:cTn id="7" dur="500" fill="hold"/>
+                                        <p:tgtEl>
+                                          <p:spTgt spid="3">
+                                            <p:txEl>
+                                              <p:pRg st="0" end="0"/>
+                                            </p:txEl>
+                                          </p:spTgt>
+                                        </p:tgtEl>
+                                        <p:attrNameLst>
+                                          <p:attrName>ppt_x</p:attrName>
+                                        </p:attrNameLst>
+                                      </p:cBhvr>
+                                      <p:tavLst>
+                                        <p:tav tm="0">
+                                          <p:val>
+                                            <p:strVal val="#ppt_x"/>
+                                          </p:val>
+                                        </p:tav>
+                                        <p:tav tm="100000">
+                                          <p:val>
+                                            <p:strVal val="#ppt_x"/>
+                                          </p:val>
+                                        </p:tav>
+                                      </p:tavLst>
+                                    </p:anim>
+                                    <p:anim calcmode="lin" valueType="num">
+                                      <p:cBhvr additive="base">
+                                        <p:cTn id="8" dur="500" fill="hold"/>
+                                        <p:tgtEl>
+                                          <p:spTgt spid="3">
+                                            <p:txEl>
+                                              <p:pRg st="0" end="0"/>
+                                            </p:txEl>
+                                          </p:spTgt>
+                                        </p:tgtEl>
+                                        <p:attrNameLst>
+                                          <p:attrName>ppt_y</p:attrName>
+                                        </p:attrNameLst>
+                                      </p:cBhvr>
+                                      <p:tavLst>
+                                        <p:tav tm="0">
+                                          <p:val>
+                                            <p:strVal val="1+#ppt_h/2"/>
+                                          </p:val>
+                                        </p:tav>
+                                        <p:tav tm="100000">
+                                          <p:val>
+                                            <p:strVal val="#ppt_y"/>
+                                          </p:val>
+                                        </p:tav>
+                                      </p:tavLst>
+                                    </p:anim>
+                                  </p:childTnLst>
+                                </p:cTn>
+                              </p:par>
+                            </p:childTnLst>
+                          </p:cTn>
+                        </p:par>
+                      </p:childTnLst>
+                    </p:cTn>
+                  </p:par>
+                  <p:par>
+                    <p:cTn id="9" fill="hold">
+                      <p:stCondLst>
+                        <p:cond delay="indefinite"/>
+                      </p:stCondLst>
+                      <p:childTnLst>
+                        <p:par>
+                          <p:cTn id="10" fill="hold">
+                            <p:stCondLst>
+                              <p:cond delay="0"/>
+                            </p:stCondLst>
+                            <p:childTnLst>
+                              <p:par>
+                                <p:cTn id="11" presetID="2" presetClass="entr" presetSubtype="4" fill="hold" grpId="0" nodeType="clickEffect">
+                                  <p:stCondLst>
+                                    <p:cond delay="0"/>
+                                  </p:stCondLst>
+                                  <p:childTnLst>
+                                    <p:set>
+                                      <p:cBhvr>
+                                        <p:cTn id="12" dur="1" fill="hold">
+                                          <p:stCondLst>
+                                            <p:cond delay="0"/>
+                                          </p:stCondLst>
+                                        </p:cTn>
+                                        <p:tgtEl>
+                                          <p:spTgt spid="3">
+                                            <p:txEl>
+                                              <p:pRg st="1" end="1"/>
+                                            </p:txEl>
+                                          </p:spTgt>
+                                        </p:tgtEl>
+                                        <p:attrNameLst>
+                                          <p:attrName>style.visibility</p:attrName>
+                                        </p:attrNameLst>
+                                      </p:cBhvr>
+                                      <p:to>
+                                        <p:strVal val="visible"/>
+                                      </p:to>
+                                    </p:set>
+                                    <p:anim calcmode="lin" valueType="num">
+                                      <p:cBhvr additive="base">
+                                        <p:cTn id="13" dur="500" fill="hold"/>
+                                        <p:tgtEl>
+                                          <p:spTgt spid="3">
+                                            <p:txEl>
+                                              <p:pRg st="1" end="1"/>
+                                            </p:txEl>
+                                          </p:spTgt>
+                                        </p:tgtEl>
+                                        <p:attrNameLst>
+                                          <p:attrName>ppt_x</p:attrName>
+                                        </p:attrNameLst>
+                                      </p:cBhvr>
+                                      <p:tavLst>
+                                        <p:tav tm="0">
+                                          <p:val>
+                                            <p:strVal val="#ppt_x"/>
+                                          </p:val>
+                                        </p:tav>
+                                        <p:tav tm="100000">
+                                          <p:val>
+                                            <p:strVal val="#ppt_x"/>
+                                          </p:val>
+                                        </p:tav>
+                                      </p:tavLst>
+                                    </p:anim>
+                                    <p:anim calcmode="lin" valueType="num">
+                                      <p:cBhvr additive="base">
+                                        <p:cTn id="14" dur="500" fill="hold"/>
+                                        <p:tgtEl>
+                                          <p:spTgt spid="3">
+                                            <p:txEl>
+                                              <p:pRg st="1" end="1"/>
+                                            </p:txEl>
+                                          </p:spTgt>
+                                        </p:tgtEl>
+                                        <p:attrNameLst>
+                                          <p:attrName>ppt_y</p:attrName>
+                                        </p:attrNameLst>
+                                      </p:cBhvr>
+                                      <p:tavLst>
+                                        <p:tav tm="0">
+                                          <p:val>
+                                            <p:strVal val="1+#ppt_h/2"/>
+                                          </p:val>
+                                        </p:tav>
+                                        <p:tav tm="100000">
+                                          <p:val>
+                                            <p:strVal val="#ppt_y"/>
+                                          </p:val>
+                                        </p:tav>
+                                      </p:tavLst>
+                                    </p:anim>
+                                  </p:childTnLst>
+                                </p:cTn>
+                              </p:par>
+                            </p:childTnLst>
+                          </p:cTn>
+                        </p:par>
+                      </p:childTnLst>
+                    </p:cTn>
+                  </p:par>
+                  <p:par>
+                    <p:cTn id="15" fill="hold">
+                      <p:stCondLst>
+                        <p:cond delay="indefinite"/>
+                      </p:stCondLst>
+                      <p:childTnLst>
+                        <p:par>
+                          <p:cTn id="16" fill="hold">
+                            <p:stCondLst>
+                              <p:cond delay="0"/>
+                            </p:stCondLst>
+                            <p:childTnLst>
+                              <p:par>
+                                <p:cTn id="17" presetID="2" presetClass="entr" presetSubtype="4" fill="hold" grpId="0" nodeType="clickEffect">
+                                  <p:stCondLst>
+                                    <p:cond delay="0"/>
+                                  </p:stCondLst>
+                                  <p:childTnLst>
+                                    <p:set>
+                                      <p:cBhvr>
+                                        <p:cTn id="18" dur="1" fill="hold">
+                                          <p:stCondLst>
+                                            <p:cond delay="0"/>
+                                          </p:stCondLst>
+                                        </p:cTn>
+                                        <p:tgtEl>
+                                          <p:spTgt spid="3">
+                                            <p:txEl>
+                                              <p:pRg st="2" end="2"/>
+                                            </p:txEl>
+                                          </p:spTgt>
+                                        </p:tgtEl>
+                                        <p:attrNameLst>
+                                          <p:attrName>style.visibility</p:attrName>
+                                        </p:attrNameLst>
+                                      </p:cBhvr>
+                                      <p:to>
+                                        <p:strVal val="visible"/>
+                                      </p:to>
+                                    </p:set>
+                                    <p:anim calcmode="lin" valueType="num">
+                                      <p:cBhvr additive="base">
+                                        <p:cTn id="19" dur="500" fill="hold"/>
+                                        <p:tgtEl>
+                                          <p:spTgt spid="3">
+                                            <p:txEl>
+                                              <p:pRg st="2" end="2"/>
+                                            </p:txEl>
+                                          </p:spTgt>
+                                        </p:tgtEl>
+                                        <p:attrNameLst>
+                                          <p:attrName>ppt_x</p:attrName>
+                                        </p:attrNameLst>
+                                      </p:cBhvr>
+                                      <p:tavLst>
+                                        <p:tav tm="0">
+                                          <p:val>
+                                            <p:strVal val="#ppt_x"/>
+                                          </p:val>
+                                        </p:tav>
+                                        <p:tav tm="100000">
+                                          <p:val>
+                                            <p:strVal val="#ppt_x"/>
+                                          </p:val>
+                                        </p:tav>
+                                      </p:tavLst>
+                                    </p:anim>
+                                    <p:anim calcmode="lin" valueType="num">
+                                      <p:cBhvr additive="base">
+                                        <p:cTn id="20" dur="500" fill="hold"/>
+                                        <p:tgtEl>
+                                          <p:spTgt spid="3">
+                                            <p:txEl>
+                                              <p:pRg st="2" end="2"/>
+                                            </p:txEl>
+                                          </p:spTgt>
+                                        </p:tgtEl>
+                                        <p:attrNameLst>
+                                          <p:attrName>ppt_y</p:attrName>
+                                        </p:attrNameLst>
+                                      </p:cBhvr>
+                                      <p:tavLst>
+                                        <p:tav tm="0">
+                                          <p:val>
+                                            <p:strVal val="1+#ppt_h/2"/>
+                                          </p:val>
+                                        </p:tav>
+                                        <p:tav tm="100000">
+                                          <p:val>
+                                            <p:strVal val="#ppt_y"/>
+                                          </p:val>
+                                        </p:tav>
+                                      </p:tavLst>
+                                    </p:anim>
+                                  </p:childTnLst>
+                                </p:cTn>
+                              </p:par>
+                            </p:childTnLst>
+                          </p:cTn>
+                        </p:par>
+                      </p:childTnLst>
+                    </p:cTn>
+                  </p:par>
+                  <p:par>
+                    <p:cTn id="21" fill="hold">
+                      <p:stCondLst>
+                        <p:cond delay="indefinite"/>
+                      </p:stCondLst>
+                      <p:childTnLst>
+                        <p:par>
+                          <p:cTn id="22" fill="hold">
+                            <p:stCondLst>
+                              <p:cond delay="0"/>
+                            </p:stCondLst>
+                            <p:childTnLst>
+                              <p:par>
+                                <p:cTn id="23" presetID="2" presetClass="entr" presetSubtype="4" fill="hold" grpId="0" nodeType="clickEffect">
+                                  <p:stCondLst>
+                                    <p:cond delay="0"/>
+                                  </p:stCondLst>
+                                  <p:childTnLst>
+                                    <p:set>
+                                      <p:cBhvr>
+                                        <p:cTn id="24" dur="1" fill="hold">
+                                          <p:stCondLst>
+                                            <p:cond delay="0"/>
+                                          </p:stCondLst>
+                                        </p:cTn>
+                                        <p:tgtEl>
+                                          <p:spTgt spid="3">
+                                            <p:txEl>
+                                              <p:pRg st="3" end="3"/>
+                                            </p:txEl>
+                                          </p:spTgt>
+                                        </p:tgtEl>
+                                        <p:attrNameLst>
+                                          <p:attrName>style.visibility</p:attrName>
+                                        </p:attrNameLst>
+                                      </p:cBhvr>
+                                      <p:to>
+                                        <p:strVal val="visible"/>
+                                      </p:to>
+                                    </p:set>
+                                    <p:anim calcmode="lin" valueType="num">
+                                      <p:cBhvr additive="base">
+                                        <p:cTn id="25" dur="500" fill="hold"/>
+                                        <p:tgtEl>
+                                          <p:spTgt spid="3">
+                                            <p:txEl>
+                                              <p:pRg st="3" end="3"/>
+                                            </p:txEl>
+                                          </p:spTgt>
+                                        </p:tgtEl>
+                                        <p:attrNameLst>
+                                          <p:attrName>ppt_x</p:attrName>
+                                        </p:attrNameLst>
+                                      </p:cBhvr>
+                                      <p:tavLst>
+                                        <p:tav tm="0">
+                                          <p:val>
+                                            <p:strVal val="#ppt_x"/>
+                                          </p:val>
+                                        </p:tav>
+                                        <p:tav tm="100000">
+                                          <p:val>
+                                            <p:strVal val="#ppt_x"/>
+                                          </p:val>
+                                        </p:tav>
+                                      </p:tavLst>
+                                    </p:anim>
+                                    <p:anim calcmode="lin" valueType="num">
+                                      <p:cBhvr additive="base">
+                                        <p:cTn id="26" dur="500" fill="hold"/>
+                                        <p:tgtEl>
+                                          <p:spTgt spid="3">
+                                            <p:txEl>
+                                              <p:pRg st="3" end="3"/>
+                                            </p:txEl>
+                                          </p:spTgt>
+                                        </p:tgtEl>
+                                        <p:attrNameLst>
+                                          <p:attrName>ppt_y</p:attrName>
+                                        </p:attrNameLst>
+                                      </p:cBhvr>
+                                      <p:tavLst>
+                                        <p:tav tm="0">
+                                          <p:val>
+                                            <p:strVal val="1+#ppt_h/2"/>
+                                          </p:val>
+                                        </p:tav>
+                                        <p:tav tm="100000">
+                                          <p:val>
+                                            <p:strVal val="#ppt_y"/>
+                                          </p:val>
+                                        </p:tav>
+                                      </p:tavLst>
+                                    </p:anim>
+                                  </p:childTnLst>
+                                </p:cTn>
+                              </p:par>
+                            </p:childTnLst>
+                          </p:cTn>
+                        </p:par>
+                      </p:childTnLst>
+                    </p:cTn>
+                  </p:par>
+                  <p:par>
+                    <p:cTn id="27" fill="hold">
+                      <p:stCondLst>
+                        <p:cond delay="indefinite"/>
+                      </p:stCondLst>
+                      <p:childTnLst>
+                        <p:par>
+                          <p:cTn id="28" fill="hold">
+                            <p:stCondLst>
+                              <p:cond delay="0"/>
+                            </p:stCondLst>
+                            <p:childTnLst>
+                              <p:par>
+                                <p:cTn id="29" presetID="2" presetClass="entr" presetSubtype="4" fill="hold" grpId="0" nodeType="clickEffect">
+                                  <p:stCondLst>
+                                    <p:cond delay="0"/>
+                                  </p:stCondLst>
+                                  <p:childTnLst>
+                                    <p:set>
+                                      <p:cBhvr>
+                                        <p:cTn id="30" dur="1" fill="hold">
+                                          <p:stCondLst>
+                                            <p:cond delay="0"/>
+                                          </p:stCondLst>
+                                        </p:cTn>
+                                        <p:tgtEl>
+                                          <p:spTgt spid="3">
+                                            <p:txEl>
+                                              <p:pRg st="4" end="4"/>
+                                            </p:txEl>
+                                          </p:spTgt>
+                                        </p:tgtEl>
+                                        <p:attrNameLst>
+                                          <p:attrName>style.visibility</p:attrName>
+                                        </p:attrNameLst>
+                                      </p:cBhvr>
+                                      <p:to>
+                                        <p:strVal val="visible"/>
+                                      </p:to>
+                                    </p:set>
+                                    <p:anim calcmode="lin" valueType="num">
+                                      <p:cBhvr additive="base">
+                                        <p:cTn id="31" dur="500" fill="hold"/>
+                                        <p:tgtEl>
+                                          <p:spTgt spid="3">
+                                            <p:txEl>
+                                              <p:pRg st="4" end="4"/>
+                                            </p:txEl>
+                                          </p:spTgt>
+                                        </p:tgtEl>
+                                        <p:attrNameLst>
+                                          <p:attrName>ppt_x</p:attrName>
+                                        </p:attrNameLst>
+                                      </p:cBhvr>
+                                      <p:tavLst>
+                                        <p:tav tm="0">
+                                          <p:val>
+                                            <p:strVal val="#ppt_x"/>
+                                          </p:val>
+                                        </p:tav>
+                                        <p:tav tm="100000">
+                                          <p:val>
+                                            <p:strVal val="#ppt_x"/>
+                                          </p:val>
+                                        </p:tav>
+                                      </p:tavLst>
+                                    </p:anim>
+                                    <p:anim calcmode="lin" valueType="num">
+                                      <p:cBhvr additive="base">
+                                        <p:cTn id="32" dur="500" fill="hold"/>
+                                        <p:tgtEl>
+                                          <p:spTgt spid="3">
+                                            <p:txEl>
+                                              <p:pRg st="4" end="4"/>
+                                            </p:txEl>
+                                          </p:spTgt>
+                                        </p:tgtEl>
+                                        <p:attrNameLst>
+                                          <p:attrName>ppt_y</p:attrName>
+                                        </p:attrNameLst>
+                                      </p:cBhvr>
+                                      <p:tavLst>
+                                        <p:tav tm="0">
+                                          <p:val>
+                                            <p:strVal val="1+#ppt_h/2"/>
+                                          </p:val>
+                                        </p:tav>
+                                        <p:tav tm="100000">
+                                          <p:val>
+                                            <p:strVal val="#ppt_y"/>
+                                          </p:val>
+                                        </p:tav>
+                                      </p:tavLst>
+                                    </p:anim>
+                                  </p:childTnLst>
+                                </p:cTn>
+                              </p:par>
+                            </p:childTnLst>
+                          </p:cTn>
+                        </p:par>
+                      </p:childTnLst>
+                    </p:cTn>
+                  </p:par>
+                  <p:par>
+                    <p:cTn id="33" fill="hold">
+                      <p:stCondLst>
+                        <p:cond delay="indefinite"/>
+                      </p:stCondLst>
+                      <p:childTnLst>
+                        <p:par>
+                          <p:cTn id="34" fill="hold">
+                            <p:stCondLst>
+                              <p:cond delay="0"/>
+                            </p:stCondLst>
+                            <p:childTnLst>
+                              <p:par>
+                                <p:cTn id="35" presetID="2" presetClass="entr" presetSubtype="4" fill="hold" grpId="0" nodeType="clickEffect">
+                                  <p:stCondLst>
+                                    <p:cond delay="0"/>
+                                  </p:stCondLst>
+                                  <p:childTnLst>
+                                    <p:set>
+                                      <p:cBhvr>
+                                        <p:cTn id="36" dur="1" fill="hold">
+                                          <p:stCondLst>
+                                            <p:cond delay="0"/>
+                                          </p:stCondLst>
+                                        </p:cTn>
+                                        <p:tgtEl>
+                                          <p:spTgt spid="3">
+                                            <p:txEl>
+                                              <p:pRg st="5" end="5"/>
+                                            </p:txEl>
+                                          </p:spTgt>
+                                        </p:tgtEl>
+                                        <p:attrNameLst>
+                                          <p:attrName>style.visibility</p:attrName>
+                                        </p:attrNameLst>
+                                      </p:cBhvr>
+                                      <p:to>
+                                        <p:strVal val="visible"/>
+                                      </p:to>
+                                    </p:set>
+                                    <p:anim calcmode="lin" valueType="num">
+                                      <p:cBhvr additive="base">
+                                        <p:cTn id="37" dur="500" fill="hold"/>
+                                        <p:tgtEl>
+                                          <p:spTgt spid="3">
+                                            <p:txEl>
+                                              <p:pRg st="5" end="5"/>
+                                            </p:txEl>
+                                          </p:spTgt>
+                                        </p:tgtEl>
+                                        <p:attrNameLst>
+                                          <p:attrName>ppt_x</p:attrName>
+                                        </p:attrNameLst>
+                                      </p:cBhvr>
+                                      <p:tavLst>
+                                        <p:tav tm="0">
+                                          <p:val>
+                                            <p:strVal val="#ppt_x"/>
+                                          </p:val>
+                                        </p:tav>
+                                        <p:tav tm="100000">
+                                          <p:val>
+                                            <p:strVal val="#ppt_x"/>
+                                          </p:val>
+                                        </p:tav>
+                                      </p:tavLst>
+                                    </p:anim>
+                                    <p:anim calcmode="lin" valueType="num">
+                                      <p:cBhvr additive="base">
+                                        <p:cTn id="38" dur="500" fill="hold"/>
+                                        <p:tgtEl>
+                                          <p:spTgt spid="3">
+                                            <p:txEl>
+                                              <p:pRg st="5" end="5"/>
+                                            </p:txEl>
+                                          </p:spTgt>
+                                        </p:tgtEl>
+                                        <p:attrNameLst>
+                                          <p:attrName>ppt_y</p:attrName>
+                                        </p:attrNameLst>
+                                      </p:cBhvr>
+                                      <p:tavLst>
+                                        <p:tav tm="0">
+                                          <p:val>
+                                            <p:strVal val="1+#ppt_h/2"/>
+                                          </p:val>
+                                        </p:tav>
+                                        <p:tav tm="100000">
+                                          <p:val>
+                                            <p:strVal val="#ppt_y"/>
+                                          </p:val>
+                                        </p:tav>
+                                      </p:tavLst>
+                                    </p:anim>
+                                  </p:childTnLst>
+                                </p:cTn>
+                              </p:par>
+                            </p:childTnLst>
+                          </p:cTn>
+                        </p:par>
+                      </p:childTnLst>
+                    </p:cTn>
+                  </p:par>
+                  <p:par>
+                    <p:cTn id="39" fill="hold">
+                      <p:stCondLst>
+                        <p:cond delay="indefinite"/>
+                      </p:stCondLst>
+                      <p:childTnLst>
+                        <p:par>
+                          <p:cTn id="40" fill="hold">
+                            <p:stCondLst>
+                              <p:cond delay="0"/>
+                            </p:stCondLst>
+                            <p:childTnLst>
+                              <p:par>
+                                <p:cTn id="41" presetID="2" presetClass="entr" presetSubtype="4" fill="hold" grpId="0" nodeType="clickEffect">
+                                  <p:stCondLst>
+                                    <p:cond delay="0"/>
+                                  </p:stCondLst>
+                                  <p:childTnLst>
+                                    <p:set>
+                                      <p:cBhvr>
+                                        <p:cTn id="42" dur="1" fill="hold">
+                                          <p:stCondLst>
+                                            <p:cond delay="0"/>
+                                          </p:stCondLst>
+                                        </p:cTn>
+                                        <p:tgtEl>
+                                          <p:spTgt spid="3">
+                                            <p:txEl>
+                                              <p:pRg st="7" end="7"/>
+                                            </p:txEl>
+                                          </p:spTgt>
+                                        </p:tgtEl>
+                                        <p:attrNameLst>
+                                          <p:attrName>style.visibility</p:attrName>
+                                        </p:attrNameLst>
+                                      </p:cBhvr>
+                                      <p:to>
+                                        <p:strVal val="visible"/>
+                                      </p:to>
+                                    </p:set>
+                                    <p:anim calcmode="lin" valueType="num">
+                                      <p:cBhvr additive="base">
+                                        <p:cTn id="43" dur="500" fill="hold"/>
+                                        <p:tgtEl>
+                                          <p:spTgt spid="3">
+                                            <p:txEl>
+                                              <p:pRg st="7" end="7"/>
+                                            </p:txEl>
+                                          </p:spTgt>
+                                        </p:tgtEl>
+                                        <p:attrNameLst>
+                                          <p:attrName>ppt_x</p:attrName>
+                                        </p:attrNameLst>
+                                      </p:cBhvr>
+                                      <p:tavLst>
+                                        <p:tav tm="0">
+                                          <p:val>
+                                            <p:strVal val="#ppt_x"/>
+                                          </p:val>
+                                        </p:tav>
+                                        <p:tav tm="100000">
+                                          <p:val>
+                                            <p:strVal val="#ppt_x"/>
+                                          </p:val>
+                                        </p:tav>
+                                      </p:tavLst>
+                                    </p:anim>
+                                    <p:anim calcmode="lin" valueType="num">
+                                      <p:cBhvr additive="base">
+                                        <p:cTn id="44" dur="500" fill="hold"/>
+                                        <p:tgtEl>
+                                          <p:spTgt spid="3">
+                                            <p:txEl>
+                                              <p:pRg st="7" end="7"/>
+                                            </p:txEl>
+                                          </p:spTgt>
+                                        </p:tgtEl>
+                                        <p:attrNameLst>
+                                          <p:attrName>ppt_y</p:attrName>
+                                        </p:attrNameLst>
+                                      </p:cBhvr>
+                                      <p:tavLst>
+                                        <p:tav tm="0">
+                                          <p:val>
+                                            <p:strVal val="1+#ppt_h/2"/>
+                                          </p:val>
+                                        </p:tav>
+                                        <p:tav tm="100000">
+                                          <p:val>
+                                            <p:strVal val="#ppt_y"/>
+                                          </p:val>
+                                        </p:tav>
+                                      </p:tavLst>
+                                    </p:anim>
+                                  </p:childTnLst>
+                                </p:cTn>
+                              </p:par>
+                            </p:childTnLst>
+                          </p:cTn>
+                        </p:par>
+                      </p:childTnLst>
+                    </p:cTn>
+                  </p:par>
+                </p:childTnLst>
+              </p:cTn>
+              <p:prevCondLst>
+                <p:cond evt="onPrev" delay="0">
+                  <p:tgtEl>
+                    <p:sldTgt/>
+                  </p:tgtEl>
+                </p:cond>
+              </p:prevCondLst>
+              <p:nextCondLst>
+                <p:cond evt="onNext" delay="0">
+                  <p:tgtEl>
+                    <p:sldTgt/>
+                  </p:tgtEl>
+                </p:cond>
+              </p:nextCondLst>
+            </p:seq>
+          </p:childTnLst>
+        </p:cTn>
+      </p:par>
+    </p:tnLst>
+    <p:bldLst>
+      <p:bldP spid="3" grpId="0" build="p"/>
+    </p:bldLst>
+  </p:timing>
+</p:sld>
+</file>
+
+<file path=ppt/slides/slide16.xml><?xml version="1.0" encoding="utf-8"?>
+<p:sld xmlns:a="http://schemas.openxmlformats.org/drawingml/2006/main" xmlns:r="http://schemas.openxmlformats.org/officeDocument/2006/relationships" xmlns:p="http://schemas.openxmlformats.org/presentationml/2006/main">
+  <p:cSld>
+    <p:spTree>
+      <p:nvGrpSpPr>
+        <p:cNvPr id="1" name=""/>
+        <p:cNvGrpSpPr/>
+        <p:nvPr/>
+      </p:nvGrpSpPr>
+      <p:grpSpPr>
+        <a:xfrm>
+          <a:off x="0" y="0"/>
+          <a:ext cx="0" cy="0"/>
+          <a:chOff x="0" y="0"/>
+          <a:chExt cx="0" cy="0"/>
+        </a:xfrm>
+      </p:grpSpPr>
+      <p:sp>
+        <p:nvSpPr>
+          <p:cNvPr id="2" name="Title 1">
+            <a:extLst>
+              <a:ext uri="{FF2B5EF4-FFF2-40B4-BE49-F238E27FC236}">
+                <a16:creationId xmlns:a16="http://schemas.microsoft.com/office/drawing/2014/main" id="{78FDD8E7-6A43-4299-907D-9BA02491DC79}"/>
+              </a:ext>
+            </a:extLst>
+          </p:cNvPr>
+          <p:cNvSpPr>
+            <a:spLocks noGrp="1"/>
+          </p:cNvSpPr>
+          <p:nvPr>
+            <p:ph type="title"/>
+          </p:nvPr>
+        </p:nvSpPr>
+        <p:spPr/>
+        <p:txBody>
+          <a:bodyPr/>
+          <a:lstStyle/>
+          <a:p>
+            <a:r>
+              <a:rPr lang="en-US" dirty="0"/>
+              <a:t>Infrastructure Overview</a:t>
+            </a:r>
+          </a:p>
+        </p:txBody>
+      </p:sp>
+      <p:sp>
+        <p:nvSpPr>
+          <p:cNvPr id="8" name="Block Arc 7">
+            <a:extLst>
+              <a:ext uri="{FF2B5EF4-FFF2-40B4-BE49-F238E27FC236}">
+                <a16:creationId xmlns:a16="http://schemas.microsoft.com/office/drawing/2014/main" id="{E71EEED1-4B45-43F9-B419-D7A88B36F4C4}"/>
+              </a:ext>
+            </a:extLst>
+          </p:cNvPr>
+          <p:cNvSpPr/>
+          <p:nvPr/>
+        </p:nvSpPr>
+        <p:spPr>
+          <a:xfrm>
+            <a:off x="6639535" y="1834622"/>
+            <a:ext cx="4874365" cy="4874364"/>
+          </a:xfrm>
+          <a:prstGeom prst="blockArc">
+            <a:avLst>
+              <a:gd name="adj1" fmla="val 10800000"/>
+              <a:gd name="adj2" fmla="val 0"/>
+              <a:gd name="adj3" fmla="val 14179"/>
+            </a:avLst>
+          </a:prstGeom>
+          <a:solidFill>
+            <a:schemeClr val="bg2">
+              <a:lumMod val="75000"/>
+            </a:schemeClr>
+          </a:solidFill>
+        </p:spPr>
+        <p:style>
+          <a:lnRef idx="2">
+            <a:schemeClr val="accent1">
+              <a:shade val="50000"/>
+            </a:schemeClr>
+          </a:lnRef>
+          <a:fillRef idx="1">
+            <a:schemeClr val="accent1"/>
+          </a:fillRef>
+          <a:effectRef idx="0">
+            <a:schemeClr val="accent1"/>
+          </a:effectRef>
+          <a:fontRef idx="minor">
+            <a:schemeClr val="lt1"/>
+          </a:fontRef>
+        </p:style>
+        <p:txBody>
+          <a:bodyPr rtlCol="0" anchor="ctr"/>
+          <a:lstStyle/>
+          <a:p>
+            <a:pPr algn="ctr"/>
+            <a:endParaRPr lang="en-US">
+              <a:solidFill>
+                <a:schemeClr val="tx1"/>
+              </a:solidFill>
+            </a:endParaRPr>
+          </a:p>
+        </p:txBody>
+      </p:sp>
+      <p:sp>
+        <p:nvSpPr>
+          <p:cNvPr id="9" name="Block Arc 8">
+            <a:extLst>
+              <a:ext uri="{FF2B5EF4-FFF2-40B4-BE49-F238E27FC236}">
+                <a16:creationId xmlns:a16="http://schemas.microsoft.com/office/drawing/2014/main" id="{86AB1127-5F5C-48FE-A1F9-D691FE898A9D}"/>
+              </a:ext>
+            </a:extLst>
+          </p:cNvPr>
+          <p:cNvSpPr/>
+          <p:nvPr/>
+        </p:nvSpPr>
+        <p:spPr>
+          <a:xfrm flipV="1">
+            <a:off x="6640656" y="1838552"/>
+            <a:ext cx="4874365" cy="4874364"/>
+          </a:xfrm>
+          <a:prstGeom prst="blockArc">
+            <a:avLst>
+              <a:gd name="adj1" fmla="val 16219981"/>
+              <a:gd name="adj2" fmla="val 0"/>
+              <a:gd name="adj3" fmla="val 14179"/>
+            </a:avLst>
+          </a:prstGeom>
+          <a:solidFill>
+            <a:srgbClr val="C00000"/>
+          </a:solidFill>
+        </p:spPr>
+        <p:style>
+          <a:lnRef idx="2">
+            <a:schemeClr val="accent1">
+              <a:shade val="50000"/>
+            </a:schemeClr>
+          </a:lnRef>
+          <a:fillRef idx="1">
+            <a:schemeClr val="accent1"/>
+          </a:fillRef>
+          <a:effectRef idx="0">
+            <a:schemeClr val="accent1"/>
+          </a:effectRef>
+          <a:fontRef idx="minor">
+            <a:schemeClr val="lt1"/>
+          </a:fontRef>
+        </p:style>
+        <p:txBody>
+          <a:bodyPr rtlCol="0" anchor="ctr"/>
+          <a:lstStyle/>
+          <a:p>
+            <a:pPr algn="ctr"/>
+            <a:endParaRPr lang="en-US">
+              <a:solidFill>
+                <a:schemeClr val="tx1"/>
+              </a:solidFill>
+            </a:endParaRPr>
+          </a:p>
+        </p:txBody>
+      </p:sp>
+      <p:sp>
+        <p:nvSpPr>
+          <p:cNvPr id="10" name="Block Arc 9">
+            <a:extLst>
+              <a:ext uri="{FF2B5EF4-FFF2-40B4-BE49-F238E27FC236}">
+                <a16:creationId xmlns:a16="http://schemas.microsoft.com/office/drawing/2014/main" id="{8182EE53-756B-4A2D-83DD-7A858D1CAF20}"/>
+              </a:ext>
+            </a:extLst>
+          </p:cNvPr>
+          <p:cNvSpPr/>
+          <p:nvPr/>
+        </p:nvSpPr>
+        <p:spPr>
+          <a:xfrm flipH="1" flipV="1">
+            <a:off x="6640094" y="1838002"/>
+            <a:ext cx="4874365" cy="4874364"/>
+          </a:xfrm>
+          <a:prstGeom prst="blockArc">
+            <a:avLst>
+              <a:gd name="adj1" fmla="val 16183083"/>
+              <a:gd name="adj2" fmla="val 0"/>
+              <a:gd name="adj3" fmla="val 14179"/>
+            </a:avLst>
+          </a:prstGeom>
+          <a:solidFill>
+            <a:schemeClr val="bg2">
+              <a:lumMod val="75000"/>
+            </a:schemeClr>
+          </a:solidFill>
+        </p:spPr>
+        <p:style>
+          <a:lnRef idx="2">
+            <a:schemeClr val="accent1">
+              <a:shade val="50000"/>
+            </a:schemeClr>
+          </a:lnRef>
+          <a:fillRef idx="1">
+            <a:schemeClr val="accent1"/>
+          </a:fillRef>
+          <a:effectRef idx="0">
+            <a:schemeClr val="accent1"/>
+          </a:effectRef>
+          <a:fontRef idx="minor">
+            <a:schemeClr val="lt1"/>
+          </a:fontRef>
+        </p:style>
+        <p:txBody>
+          <a:bodyPr rtlCol="0" anchor="ctr"/>
+          <a:lstStyle/>
+          <a:p>
+            <a:pPr algn="ctr"/>
+            <a:endParaRPr lang="en-US">
+              <a:solidFill>
+                <a:schemeClr val="tx1"/>
+              </a:solidFill>
+            </a:endParaRPr>
+          </a:p>
+        </p:txBody>
+      </p:sp>
+      <p:sp>
+        <p:nvSpPr>
+          <p:cNvPr id="11" name="Circle: Hollow 10">
+            <a:extLst>
+              <a:ext uri="{FF2B5EF4-FFF2-40B4-BE49-F238E27FC236}">
+                <a16:creationId xmlns:a16="http://schemas.microsoft.com/office/drawing/2014/main" id="{3B768160-05EA-4308-8DE9-6F4B958F4AD0}"/>
+              </a:ext>
+            </a:extLst>
+          </p:cNvPr>
+          <p:cNvSpPr/>
+          <p:nvPr/>
+        </p:nvSpPr>
+        <p:spPr>
+          <a:xfrm>
+            <a:off x="7334907" y="2531398"/>
+            <a:ext cx="3484742" cy="3484740"/>
+          </a:xfrm>
+          <a:prstGeom prst="donut">
+            <a:avLst>
+              <a:gd name="adj" fmla="val 21109"/>
+            </a:avLst>
+          </a:prstGeom>
+          <a:solidFill>
+            <a:schemeClr val="bg2">
+              <a:lumMod val="75000"/>
+            </a:schemeClr>
+          </a:solidFill>
+        </p:spPr>
+        <p:style>
+          <a:lnRef idx="2">
+            <a:schemeClr val="accent1">
+              <a:shade val="50000"/>
+            </a:schemeClr>
+          </a:lnRef>
+          <a:fillRef idx="1">
+            <a:schemeClr val="accent1"/>
+          </a:fillRef>
+          <a:effectRef idx="0">
+            <a:schemeClr val="accent1"/>
+          </a:effectRef>
+          <a:fontRef idx="minor">
+            <a:schemeClr val="lt1"/>
+          </a:fontRef>
+        </p:style>
+        <p:txBody>
+          <a:bodyPr rtlCol="0" anchor="ctr"/>
+          <a:lstStyle/>
+          <a:p>
+            <a:pPr algn="ctr"/>
+            <a:endParaRPr lang="en-US" dirty="0">
+              <a:solidFill>
+                <a:schemeClr val="tx1"/>
+              </a:solidFill>
+            </a:endParaRPr>
+          </a:p>
+        </p:txBody>
+      </p:sp>
+      <p:sp>
+        <p:nvSpPr>
+          <p:cNvPr id="13" name="Oval 12">
+            <a:extLst>
+              <a:ext uri="{FF2B5EF4-FFF2-40B4-BE49-F238E27FC236}">
+                <a16:creationId xmlns:a16="http://schemas.microsoft.com/office/drawing/2014/main" id="{6B632BF4-A365-49C5-90AA-107A908D835E}"/>
+              </a:ext>
+            </a:extLst>
+          </p:cNvPr>
+          <p:cNvSpPr/>
+          <p:nvPr/>
+        </p:nvSpPr>
+        <p:spPr>
+          <a:xfrm>
+            <a:off x="8078232" y="3274723"/>
+            <a:ext cx="1998094" cy="1998092"/>
+          </a:xfrm>
+          <a:prstGeom prst="ellipse">
+            <a:avLst/>
+          </a:prstGeom>
+          <a:solidFill>
+            <a:schemeClr val="bg2">
+              <a:lumMod val="75000"/>
+            </a:schemeClr>
+          </a:solidFill>
+        </p:spPr>
+        <p:style>
+          <a:lnRef idx="2">
+            <a:schemeClr val="accent1">
+              <a:shade val="50000"/>
+            </a:schemeClr>
+          </a:lnRef>
+          <a:fillRef idx="1">
+            <a:schemeClr val="accent1"/>
+          </a:fillRef>
+          <a:effectRef idx="0">
+            <a:schemeClr val="accent1"/>
+          </a:effectRef>
+          <a:fontRef idx="minor">
+            <a:schemeClr val="lt1"/>
+          </a:fontRef>
+        </p:style>
+        <p:txBody>
+          <a:bodyPr rtlCol="0" anchor="ctr"/>
+          <a:lstStyle/>
+          <a:p>
+            <a:pPr algn="ctr"/>
+            <a:r>
+              <a:rPr lang="en-US" dirty="0"/>
+              <a:t>Domain</a:t>
+            </a:r>
+          </a:p>
+        </p:txBody>
+      </p:sp>
+      <p:sp>
+        <p:nvSpPr>
+          <p:cNvPr id="14" name="TextBox 13">
+            <a:extLst>
+              <a:ext uri="{FF2B5EF4-FFF2-40B4-BE49-F238E27FC236}">
+                <a16:creationId xmlns:a16="http://schemas.microsoft.com/office/drawing/2014/main" id="{114D07BD-35F4-4D52-872D-1878379108A2}"/>
+              </a:ext>
+            </a:extLst>
+          </p:cNvPr>
+          <p:cNvSpPr txBox="1"/>
+          <p:nvPr/>
+        </p:nvSpPr>
+        <p:spPr>
+          <a:xfrm>
+            <a:off x="8454204" y="2737474"/>
+            <a:ext cx="1245021" cy="369332"/>
+          </a:xfrm>
+          <a:prstGeom prst="rect">
+            <a:avLst/>
+          </a:prstGeom>
+          <a:noFill/>
+        </p:spPr>
+        <p:txBody>
+          <a:bodyPr wrap="none" rtlCol="0">
+            <a:spAutoFit/>
+          </a:bodyPr>
+          <a:lstStyle/>
+          <a:p>
+            <a:pPr algn="ctr"/>
+            <a:r>
+              <a:rPr lang="en-US" dirty="0">
+                <a:solidFill>
+                  <a:schemeClr val="bg1"/>
+                </a:solidFill>
+              </a:rPr>
+              <a:t>Application</a:t>
+            </a:r>
+          </a:p>
+        </p:txBody>
+      </p:sp>
+      <p:sp>
+        <p:nvSpPr>
+          <p:cNvPr id="15" name="TextBox 14">
+            <a:extLst>
+              <a:ext uri="{FF2B5EF4-FFF2-40B4-BE49-F238E27FC236}">
+                <a16:creationId xmlns:a16="http://schemas.microsoft.com/office/drawing/2014/main" id="{041EA6B2-886C-49A8-AD0E-EBBB070F07C3}"/>
+              </a:ext>
+            </a:extLst>
+          </p:cNvPr>
+          <p:cNvSpPr txBox="1"/>
+          <p:nvPr/>
+        </p:nvSpPr>
+        <p:spPr>
+          <a:xfrm>
+            <a:off x="8388290" y="2006213"/>
+            <a:ext cx="1376851" cy="369332"/>
+          </a:xfrm>
+          <a:prstGeom prst="rect">
+            <a:avLst/>
+          </a:prstGeom>
+          <a:noFill/>
+        </p:spPr>
+        <p:txBody>
+          <a:bodyPr wrap="none" rtlCol="0">
+            <a:spAutoFit/>
+          </a:bodyPr>
+          <a:lstStyle/>
+          <a:p>
+            <a:pPr algn="ctr"/>
+            <a:r>
+              <a:rPr lang="en-US" dirty="0">
+                <a:solidFill>
+                  <a:schemeClr val="bg1"/>
+                </a:solidFill>
+              </a:rPr>
+              <a:t>Presentation</a:t>
+            </a:r>
+          </a:p>
+        </p:txBody>
+      </p:sp>
+      <p:sp>
+        <p:nvSpPr>
+          <p:cNvPr id="16" name="TextBox 15">
+            <a:extLst>
+              <a:ext uri="{FF2B5EF4-FFF2-40B4-BE49-F238E27FC236}">
+                <a16:creationId xmlns:a16="http://schemas.microsoft.com/office/drawing/2014/main" id="{DEA856A3-5C85-4201-B42A-5BDCE9843410}"/>
+              </a:ext>
+            </a:extLst>
+          </p:cNvPr>
+          <p:cNvSpPr txBox="1"/>
+          <p:nvPr/>
+        </p:nvSpPr>
+        <p:spPr>
+          <a:xfrm rot="2993722">
+            <a:off x="6964049" y="5418928"/>
+            <a:ext cx="1245020" cy="369332"/>
+          </a:xfrm>
+          <a:prstGeom prst="rect">
+            <a:avLst/>
+          </a:prstGeom>
+          <a:noFill/>
+        </p:spPr>
+        <p:txBody>
+          <a:bodyPr wrap="none" rtlCol="0">
+            <a:spAutoFit/>
+          </a:bodyPr>
+          <a:lstStyle/>
+          <a:p>
+            <a:pPr algn="ctr"/>
+            <a:r>
+              <a:rPr lang="en-US" dirty="0">
+                <a:solidFill>
+                  <a:schemeClr val="bg1"/>
+                </a:solidFill>
+              </a:rPr>
+              <a:t>Persistence</a:t>
+            </a:r>
+          </a:p>
+        </p:txBody>
+      </p:sp>
+      <p:sp>
+        <p:nvSpPr>
+          <p:cNvPr id="17" name="TextBox 16">
+            <a:extLst>
+              <a:ext uri="{FF2B5EF4-FFF2-40B4-BE49-F238E27FC236}">
+                <a16:creationId xmlns:a16="http://schemas.microsoft.com/office/drawing/2014/main" id="{D667BF82-4852-4145-85E8-985151A29308}"/>
+              </a:ext>
+            </a:extLst>
+          </p:cNvPr>
+          <p:cNvSpPr txBox="1"/>
+          <p:nvPr/>
+        </p:nvSpPr>
+        <p:spPr>
+          <a:xfrm rot="18967554">
+            <a:off x="9859802" y="5418927"/>
+            <a:ext cx="1474634" cy="369332"/>
+          </a:xfrm>
+          <a:prstGeom prst="rect">
+            <a:avLst/>
+          </a:prstGeom>
+          <a:noFill/>
+        </p:spPr>
+        <p:txBody>
+          <a:bodyPr wrap="none" rtlCol="0">
+            <a:spAutoFit/>
+          </a:bodyPr>
+          <a:lstStyle/>
+          <a:p>
+            <a:pPr algn="ctr"/>
+            <a:r>
+              <a:rPr lang="en-US" dirty="0">
+                <a:solidFill>
+                  <a:schemeClr val="bg1"/>
+                </a:solidFill>
+              </a:rPr>
+              <a:t>Infrastructure</a:t>
+            </a:r>
+          </a:p>
+        </p:txBody>
+      </p:sp>
+      <p:sp>
+        <p:nvSpPr>
+          <p:cNvPr id="18" name="Arrow: Right 17">
+            <a:extLst>
+              <a:ext uri="{FF2B5EF4-FFF2-40B4-BE49-F238E27FC236}">
+                <a16:creationId xmlns:a16="http://schemas.microsoft.com/office/drawing/2014/main" id="{852F9670-D6FE-40E6-A3ED-7ED09F34CCDA}"/>
+              </a:ext>
+            </a:extLst>
+          </p:cNvPr>
+          <p:cNvSpPr/>
+          <p:nvPr/>
+        </p:nvSpPr>
+        <p:spPr>
+          <a:xfrm rot="5400000">
+            <a:off x="8892048" y="3167342"/>
+            <a:ext cx="369332" cy="291080"/>
+          </a:xfrm>
+          <a:prstGeom prst="rightArrow">
+            <a:avLst/>
+          </a:prstGeom>
+          <a:solidFill>
+            <a:schemeClr val="bg2">
+              <a:lumMod val="75000"/>
+            </a:schemeClr>
+          </a:solidFill>
+        </p:spPr>
+        <p:style>
+          <a:lnRef idx="2">
+            <a:schemeClr val="accent1">
+              <a:shade val="50000"/>
+            </a:schemeClr>
+          </a:lnRef>
+          <a:fillRef idx="1">
+            <a:schemeClr val="accent1"/>
+          </a:fillRef>
+          <a:effectRef idx="0">
+            <a:schemeClr val="accent1"/>
+          </a:effectRef>
+          <a:fontRef idx="minor">
+            <a:schemeClr val="lt1"/>
+          </a:fontRef>
+        </p:style>
+        <p:txBody>
+          <a:bodyPr rtlCol="0" anchor="ctr"/>
+          <a:lstStyle/>
+          <a:p>
+            <a:pPr algn="ctr"/>
+            <a:endParaRPr lang="en-US"/>
+          </a:p>
+        </p:txBody>
+      </p:sp>
+      <p:sp>
+        <p:nvSpPr>
+          <p:cNvPr id="19" name="Arrow: Right 18">
+            <a:extLst>
+              <a:ext uri="{FF2B5EF4-FFF2-40B4-BE49-F238E27FC236}">
+                <a16:creationId xmlns:a16="http://schemas.microsoft.com/office/drawing/2014/main" id="{A3559769-707F-409E-A0B6-3F1C187DA4F7}"/>
+              </a:ext>
+            </a:extLst>
+          </p:cNvPr>
+          <p:cNvSpPr/>
+          <p:nvPr/>
+        </p:nvSpPr>
+        <p:spPr>
+          <a:xfrm rot="5400000">
+            <a:off x="8899102" y="2424017"/>
+            <a:ext cx="369332" cy="291080"/>
+          </a:xfrm>
+          <a:prstGeom prst="rightArrow">
+            <a:avLst/>
+          </a:prstGeom>
+          <a:solidFill>
+            <a:schemeClr val="bg2">
+              <a:lumMod val="75000"/>
+            </a:schemeClr>
+          </a:solidFill>
+        </p:spPr>
+        <p:style>
+          <a:lnRef idx="2">
+            <a:schemeClr val="accent1">
+              <a:shade val="50000"/>
+            </a:schemeClr>
+          </a:lnRef>
+          <a:fillRef idx="1">
+            <a:schemeClr val="accent1"/>
+          </a:fillRef>
+          <a:effectRef idx="0">
+            <a:schemeClr val="accent1"/>
+          </a:effectRef>
+          <a:fontRef idx="minor">
+            <a:schemeClr val="lt1"/>
+          </a:fontRef>
+        </p:style>
+        <p:txBody>
+          <a:bodyPr rtlCol="0" anchor="ctr"/>
+          <a:lstStyle/>
+          <a:p>
+            <a:pPr algn="ctr"/>
+            <a:endParaRPr lang="en-US"/>
+          </a:p>
+        </p:txBody>
+      </p:sp>
+      <p:sp>
+        <p:nvSpPr>
+          <p:cNvPr id="20" name="Arrow: Right 19">
+            <a:extLst>
+              <a:ext uri="{FF2B5EF4-FFF2-40B4-BE49-F238E27FC236}">
+                <a16:creationId xmlns:a16="http://schemas.microsoft.com/office/drawing/2014/main" id="{8FE53732-9890-4E69-9CE7-639F26043EB9}"/>
+              </a:ext>
+            </a:extLst>
+          </p:cNvPr>
+          <p:cNvSpPr/>
+          <p:nvPr/>
+        </p:nvSpPr>
+        <p:spPr>
+          <a:xfrm rot="18900000">
+            <a:off x="7635384" y="5265564"/>
+            <a:ext cx="369332" cy="291080"/>
+          </a:xfrm>
+          <a:prstGeom prst="rightArrow">
+            <a:avLst/>
+          </a:prstGeom>
+          <a:solidFill>
+            <a:schemeClr val="bg2">
+              <a:lumMod val="75000"/>
+            </a:schemeClr>
+          </a:solidFill>
+        </p:spPr>
+        <p:style>
+          <a:lnRef idx="2">
+            <a:schemeClr val="accent1">
+              <a:shade val="50000"/>
+            </a:schemeClr>
+          </a:lnRef>
+          <a:fillRef idx="1">
+            <a:schemeClr val="accent1"/>
+          </a:fillRef>
+          <a:effectRef idx="0">
+            <a:schemeClr val="accent1"/>
+          </a:effectRef>
+          <a:fontRef idx="minor">
+            <a:schemeClr val="lt1"/>
+          </a:fontRef>
+        </p:style>
+        <p:txBody>
+          <a:bodyPr rtlCol="0" anchor="ctr"/>
+          <a:lstStyle/>
+          <a:p>
+            <a:pPr algn="ctr"/>
+            <a:endParaRPr lang="en-US"/>
+          </a:p>
+        </p:txBody>
+      </p:sp>
+      <p:sp>
+        <p:nvSpPr>
+          <p:cNvPr id="21" name="Arrow: Right 20">
+            <a:extLst>
+              <a:ext uri="{FF2B5EF4-FFF2-40B4-BE49-F238E27FC236}">
+                <a16:creationId xmlns:a16="http://schemas.microsoft.com/office/drawing/2014/main" id="{AC3EC937-3D1B-4783-949A-3C146E028367}"/>
+              </a:ext>
+            </a:extLst>
+          </p:cNvPr>
+          <p:cNvSpPr/>
+          <p:nvPr/>
+        </p:nvSpPr>
+        <p:spPr>
+          <a:xfrm rot="13500000">
+            <a:off x="10182265" y="5265564"/>
+            <a:ext cx="369332" cy="291080"/>
+          </a:xfrm>
+          <a:prstGeom prst="rightArrow">
+            <a:avLst/>
+          </a:prstGeom>
+          <a:solidFill>
+            <a:schemeClr val="bg2">
+              <a:lumMod val="75000"/>
+            </a:schemeClr>
+          </a:solidFill>
+        </p:spPr>
+        <p:style>
+          <a:lnRef idx="2">
+            <a:schemeClr val="accent1">
+              <a:shade val="50000"/>
+            </a:schemeClr>
+          </a:lnRef>
+          <a:fillRef idx="1">
+            <a:schemeClr val="accent1"/>
+          </a:fillRef>
+          <a:effectRef idx="0">
+            <a:schemeClr val="accent1"/>
+          </a:effectRef>
+          <a:fontRef idx="minor">
+            <a:schemeClr val="lt1"/>
+          </a:fontRef>
+        </p:style>
+        <p:txBody>
+          <a:bodyPr rtlCol="0" anchor="ctr"/>
+          <a:lstStyle/>
+          <a:p>
+            <a:pPr algn="ctr"/>
+            <a:endParaRPr lang="en-US"/>
+          </a:p>
+        </p:txBody>
+      </p:sp>
+      <p:sp>
+        <p:nvSpPr>
+          <p:cNvPr id="28" name="Content Placeholder 2">
+            <a:extLst>
+              <a:ext uri="{FF2B5EF4-FFF2-40B4-BE49-F238E27FC236}">
+                <a16:creationId xmlns:a16="http://schemas.microsoft.com/office/drawing/2014/main" id="{77BDCD5C-E1B5-4726-98B6-2BEE2675C06C}"/>
+              </a:ext>
+            </a:extLst>
+          </p:cNvPr>
+          <p:cNvSpPr txBox="1">
+            <a:spLocks/>
+          </p:cNvSpPr>
+          <p:nvPr/>
+        </p:nvSpPr>
+        <p:spPr>
+          <a:xfrm>
+            <a:off x="838200" y="1822067"/>
+            <a:ext cx="5181600" cy="4351338"/>
+          </a:xfrm>
+          <a:prstGeom prst="rect">
+            <a:avLst/>
+          </a:prstGeom>
+        </p:spPr>
+        <p:txBody>
+          <a:bodyPr vert="horz" lIns="91440" tIns="45720" rIns="91440" bIns="45720" rtlCol="0">
+            <a:normAutofit/>
+          </a:bodyPr>
+          <a:lstStyle>
+            <a:lvl1pPr marL="228600" indent="-228600" algn="l" defTabSz="914400" rtl="0" eaLnBrk="1" latinLnBrk="0" hangingPunct="1">
+              <a:lnSpc>
+                <a:spcPct val="90000"/>
+              </a:lnSpc>
+              <a:spcBef>
+                <a:spcPts val="1000"/>
+              </a:spcBef>
+              <a:buFont typeface="Arial" panose="020B0604020202020204" pitchFamily="34" charset="0"/>
+              <a:buChar char="•"/>
+              <a:defRPr sz="2800" kern="1200">
+                <a:solidFill>
+                  <a:schemeClr val="tx1"/>
+                </a:solidFill>
+                <a:latin typeface="+mn-lt"/>
+                <a:ea typeface="+mn-ea"/>
+                <a:cs typeface="+mn-cs"/>
+              </a:defRPr>
+            </a:lvl1pPr>
+            <a:lvl2pPr marL="685800" indent="-228600" algn="l" defTabSz="914400" rtl="0" eaLnBrk="1" latinLnBrk="0" hangingPunct="1">
+              <a:lnSpc>
+                <a:spcPct val="90000"/>
+              </a:lnSpc>
+              <a:spcBef>
+                <a:spcPts val="500"/>
+              </a:spcBef>
+              <a:buFont typeface="Arial" panose="020B0604020202020204" pitchFamily="34" charset="0"/>
+              <a:buChar char="•"/>
+              <a:defRPr sz="2400" kern="1200">
+                <a:solidFill>
+                  <a:schemeClr val="tx1"/>
+                </a:solidFill>
+                <a:latin typeface="+mn-lt"/>
+                <a:ea typeface="+mn-ea"/>
+                <a:cs typeface="+mn-cs"/>
+              </a:defRPr>
+            </a:lvl2pPr>
+            <a:lvl3pPr marL="1143000" indent="-228600" algn="l" defTabSz="914400" rtl="0" eaLnBrk="1" latinLnBrk="0" hangingPunct="1">
+              <a:lnSpc>
+                <a:spcPct val="90000"/>
+              </a:lnSpc>
+              <a:spcBef>
+                <a:spcPts val="500"/>
+              </a:spcBef>
+              <a:buFont typeface="Arial" panose="020B0604020202020204" pitchFamily="34" charset="0"/>
+              <a:buChar char="•"/>
+              <a:defRPr sz="2000" kern="1200">
+                <a:solidFill>
+                  <a:schemeClr val="tx1"/>
+                </a:solidFill>
+                <a:latin typeface="+mn-lt"/>
+                <a:ea typeface="+mn-ea"/>
+                <a:cs typeface="+mn-cs"/>
+              </a:defRPr>
+            </a:lvl3pPr>
+            <a:lvl4pPr marL="1600200" indent="-228600" algn="l" defTabSz="914400" rtl="0" eaLnBrk="1" latinLnBrk="0" hangingPunct="1">
+              <a:lnSpc>
+                <a:spcPct val="90000"/>
+              </a:lnSpc>
+              <a:spcBef>
+                <a:spcPts val="500"/>
+              </a:spcBef>
+              <a:buFont typeface="Arial" panose="020B0604020202020204" pitchFamily="34" charset="0"/>
+              <a:buChar char="•"/>
+              <a:defRPr sz="1800" kern="1200">
+                <a:solidFill>
+                  <a:schemeClr val="tx1"/>
+                </a:solidFill>
+                <a:latin typeface="+mn-lt"/>
+                <a:ea typeface="+mn-ea"/>
+                <a:cs typeface="+mn-cs"/>
+              </a:defRPr>
+            </a:lvl4pPr>
+            <a:lvl5pPr marL="2057400" indent="-228600" algn="l" defTabSz="914400" rtl="0" eaLnBrk="1" latinLnBrk="0" hangingPunct="1">
+              <a:lnSpc>
+                <a:spcPct val="90000"/>
+              </a:lnSpc>
+              <a:spcBef>
+                <a:spcPts val="500"/>
+              </a:spcBef>
+              <a:buFont typeface="Arial" panose="020B0604020202020204" pitchFamily="34" charset="0"/>
+              <a:buChar char="•"/>
+              <a:defRPr sz="1800" kern="1200">
+                <a:solidFill>
+                  <a:schemeClr val="tx1"/>
+                </a:solidFill>
+                <a:latin typeface="+mn-lt"/>
+                <a:ea typeface="+mn-ea"/>
+                <a:cs typeface="+mn-cs"/>
+              </a:defRPr>
+            </a:lvl5pPr>
+            <a:lvl6pPr marL="2514600" indent="-228600" algn="l" defTabSz="914400" rtl="0" eaLnBrk="1" latinLnBrk="0" hangingPunct="1">
+              <a:lnSpc>
+                <a:spcPct val="90000"/>
+              </a:lnSpc>
+              <a:spcBef>
+                <a:spcPts val="500"/>
+              </a:spcBef>
+              <a:buFont typeface="Arial" panose="020B0604020202020204" pitchFamily="34" charset="0"/>
+              <a:buChar char="•"/>
+              <a:defRPr sz="1800" kern="1200">
+                <a:solidFill>
+                  <a:schemeClr val="tx1"/>
+                </a:solidFill>
+                <a:latin typeface="+mn-lt"/>
+                <a:ea typeface="+mn-ea"/>
+                <a:cs typeface="+mn-cs"/>
+              </a:defRPr>
+            </a:lvl6pPr>
+            <a:lvl7pPr marL="2971800" indent="-228600" algn="l" defTabSz="914400" rtl="0" eaLnBrk="1" latinLnBrk="0" hangingPunct="1">
+              <a:lnSpc>
+                <a:spcPct val="90000"/>
+              </a:lnSpc>
+              <a:spcBef>
+                <a:spcPts val="500"/>
+              </a:spcBef>
+              <a:buFont typeface="Arial" panose="020B0604020202020204" pitchFamily="34" charset="0"/>
+              <a:buChar char="•"/>
+              <a:defRPr sz="1800" kern="1200">
+                <a:solidFill>
+                  <a:schemeClr val="tx1"/>
+                </a:solidFill>
+                <a:latin typeface="+mn-lt"/>
+                <a:ea typeface="+mn-ea"/>
+                <a:cs typeface="+mn-cs"/>
+              </a:defRPr>
+            </a:lvl7pPr>
+            <a:lvl8pPr marL="3429000" indent="-228600" algn="l" defTabSz="914400" rtl="0" eaLnBrk="1" latinLnBrk="0" hangingPunct="1">
+              <a:lnSpc>
+                <a:spcPct val="90000"/>
+              </a:lnSpc>
+              <a:spcBef>
+                <a:spcPts val="500"/>
+              </a:spcBef>
+              <a:buFont typeface="Arial" panose="020B0604020202020204" pitchFamily="34" charset="0"/>
+              <a:buChar char="•"/>
+              <a:defRPr sz="1800" kern="1200">
+                <a:solidFill>
+                  <a:schemeClr val="tx1"/>
+                </a:solidFill>
+                <a:latin typeface="+mn-lt"/>
+                <a:ea typeface="+mn-ea"/>
+                <a:cs typeface="+mn-cs"/>
+              </a:defRPr>
+            </a:lvl8pPr>
+            <a:lvl9pPr marL="3886200" indent="-228600" algn="l" defTabSz="914400" rtl="0" eaLnBrk="1" latinLnBrk="0" hangingPunct="1">
+              <a:lnSpc>
+                <a:spcPct val="90000"/>
+              </a:lnSpc>
+              <a:spcBef>
+                <a:spcPts val="500"/>
+              </a:spcBef>
+              <a:buFont typeface="Arial" panose="020B0604020202020204" pitchFamily="34" charset="0"/>
+              <a:buChar char="•"/>
+              <a:defRPr sz="1800" kern="1200">
+                <a:solidFill>
+                  <a:schemeClr val="tx1"/>
+                </a:solidFill>
+                <a:latin typeface="+mn-lt"/>
+                <a:ea typeface="+mn-ea"/>
+                <a:cs typeface="+mn-cs"/>
+              </a:defRPr>
+            </a:lvl9pPr>
+          </a:lstStyle>
+          <a:p>
+            <a:pPr marL="0" indent="0">
+              <a:buNone/>
+            </a:pPr>
+            <a:r>
+              <a:rPr lang="en-US" dirty="0"/>
+              <a:t>Remember, </a:t>
+            </a:r>
+            <a:r>
+              <a:rPr lang="en-US"/>
+              <a:t>abstractions in Core</a:t>
+            </a:r>
+          </a:p>
+          <a:p>
+            <a:pPr marL="0" indent="0">
+              <a:buNone/>
+            </a:pPr>
+            <a:r>
+              <a:rPr lang="en-US" dirty="0"/>
+              <a:t>Implementations</a:t>
+            </a:r>
+          </a:p>
+          <a:p>
+            <a:pPr marL="0" indent="0">
+              <a:buNone/>
+            </a:pPr>
+            <a:r>
+              <a:rPr lang="en-US" dirty="0"/>
+              <a:t>    API Clients</a:t>
+            </a:r>
+          </a:p>
+          <a:p>
+            <a:pPr marL="0" indent="0">
+              <a:buNone/>
+            </a:pPr>
+            <a:r>
+              <a:rPr lang="en-US" dirty="0"/>
+              <a:t>    File System</a:t>
+            </a:r>
+          </a:p>
+          <a:p>
+            <a:pPr marL="0" indent="0">
+              <a:buNone/>
+            </a:pPr>
+            <a:r>
+              <a:rPr lang="en-US" dirty="0"/>
+              <a:t>    Email / SMS</a:t>
+            </a:r>
+          </a:p>
+          <a:p>
+            <a:pPr marL="0" indent="0">
+              <a:buNone/>
+            </a:pPr>
+            <a:r>
+              <a:rPr lang="en-US" dirty="0"/>
+              <a:t>    System Clock</a:t>
+            </a:r>
+          </a:p>
+          <a:p>
+            <a:pPr marL="0" indent="0">
+              <a:buNone/>
+            </a:pPr>
+            <a:r>
+              <a:rPr lang="en-US" dirty="0"/>
+              <a:t>    Anything External</a:t>
+            </a:r>
+          </a:p>
+        </p:txBody>
+      </p:sp>
+    </p:spTree>
+    <p:extLst>
+      <p:ext uri="{BB962C8B-B14F-4D97-AF65-F5344CB8AC3E}">
+        <p14:creationId xmlns:p14="http://schemas.microsoft.com/office/powerpoint/2010/main" val="3736581403"/>
+      </p:ext>
+    </p:extLst>
+  </p:cSld>
+  <p:clrMapOvr>
+    <a:masterClrMapping/>
+  </p:clrMapOvr>
+  <p:timing>
+    <p:tnLst>
+      <p:par>
+        <p:cTn id="1" dur="indefinite" restart="never" nodeType="tmRoot">
+          <p:childTnLst>
+            <p:seq concurrent="1" nextAc="seek">
+              <p:cTn id="2" dur="indefinite" nodeType="mainSeq">
+                <p:childTnLst>
+                  <p:par>
+                    <p:cTn id="3" fill="hold">
+                      <p:stCondLst>
+                        <p:cond delay="indefinite"/>
+                      </p:stCondLst>
+                      <p:childTnLst>
+                        <p:par>
+                          <p:cTn id="4" fill="hold">
+                            <p:stCondLst>
+                              <p:cond delay="0"/>
+                            </p:stCondLst>
+                            <p:childTnLst>
+                              <p:par>
+                                <p:cTn id="5" presetID="2" presetClass="entr" presetSubtype="4" fill="hold" grpId="0" nodeType="clickEffect">
+                                  <p:stCondLst>
+                                    <p:cond delay="0"/>
+                                  </p:stCondLst>
+                                  <p:childTnLst>
+                                    <p:set>
+                                      <p:cBhvr>
+                                        <p:cTn id="6" dur="1" fill="hold">
+                                          <p:stCondLst>
+                                            <p:cond delay="0"/>
+                                          </p:stCondLst>
+                                        </p:cTn>
+                                        <p:tgtEl>
+                                          <p:spTgt spid="28">
+                                            <p:txEl>
+                                              <p:pRg st="0" end="0"/>
+                                            </p:txEl>
+                                          </p:spTgt>
+                                        </p:tgtEl>
+                                        <p:attrNameLst>
+                                          <p:attrName>style.visibility</p:attrName>
+                                        </p:attrNameLst>
+                                      </p:cBhvr>
+                                      <p:to>
+                                        <p:strVal val="visible"/>
+                                      </p:to>
+                                    </p:set>
+                                    <p:anim calcmode="lin" valueType="num">
+                                      <p:cBhvr additive="base">
+                                        <p:cTn id="7" dur="500" fill="hold"/>
+                                        <p:tgtEl>
+                                          <p:spTgt spid="28">
+                                            <p:txEl>
+                                              <p:pRg st="0" end="0"/>
+                                            </p:txEl>
+                                          </p:spTgt>
+                                        </p:tgtEl>
+                                        <p:attrNameLst>
+                                          <p:attrName>ppt_x</p:attrName>
+                                        </p:attrNameLst>
+                                      </p:cBhvr>
+                                      <p:tavLst>
+                                        <p:tav tm="0">
+                                          <p:val>
+                                            <p:strVal val="#ppt_x"/>
+                                          </p:val>
+                                        </p:tav>
+                                        <p:tav tm="100000">
+                                          <p:val>
+                                            <p:strVal val="#ppt_x"/>
+                                          </p:val>
+                                        </p:tav>
+                                      </p:tavLst>
+                                    </p:anim>
+                                    <p:anim calcmode="lin" valueType="num">
+                                      <p:cBhvr additive="base">
+                                        <p:cTn id="8" dur="500" fill="hold"/>
+                                        <p:tgtEl>
+                                          <p:spTgt spid="28">
+                                            <p:txEl>
+                                              <p:pRg st="0" end="0"/>
+                                            </p:txEl>
+                                          </p:spTgt>
+                                        </p:tgtEl>
+                                        <p:attrNameLst>
+                                          <p:attrName>ppt_y</p:attrName>
+                                        </p:attrNameLst>
+                                      </p:cBhvr>
+                                      <p:tavLst>
+                                        <p:tav tm="0">
+                                          <p:val>
+                                            <p:strVal val="1+#ppt_h/2"/>
+                                          </p:val>
+                                        </p:tav>
+                                        <p:tav tm="100000">
+                                          <p:val>
+                                            <p:strVal val="#ppt_y"/>
+                                          </p:val>
+                                        </p:tav>
+                                      </p:tavLst>
+                                    </p:anim>
+                                  </p:childTnLst>
+                                </p:cTn>
+                              </p:par>
+                            </p:childTnLst>
+                          </p:cTn>
+                        </p:par>
+                      </p:childTnLst>
+                    </p:cTn>
+                  </p:par>
+                  <p:par>
+                    <p:cTn id="9" fill="hold">
+                      <p:stCondLst>
+                        <p:cond delay="indefinite"/>
+                      </p:stCondLst>
+                      <p:childTnLst>
+                        <p:par>
+                          <p:cTn id="10" fill="hold">
+                            <p:stCondLst>
+                              <p:cond delay="0"/>
+                            </p:stCondLst>
+                            <p:childTnLst>
+                              <p:par>
+                                <p:cTn id="11" presetID="2" presetClass="entr" presetSubtype="4" fill="hold" grpId="0" nodeType="clickEffect">
+                                  <p:stCondLst>
+                                    <p:cond delay="0"/>
+                                  </p:stCondLst>
+                                  <p:childTnLst>
+                                    <p:set>
+                                      <p:cBhvr>
+                                        <p:cTn id="12" dur="1" fill="hold">
+                                          <p:stCondLst>
+                                            <p:cond delay="0"/>
+                                          </p:stCondLst>
+                                        </p:cTn>
+                                        <p:tgtEl>
+                                          <p:spTgt spid="28">
+                                            <p:txEl>
+                                              <p:pRg st="1" end="1"/>
+                                            </p:txEl>
+                                          </p:spTgt>
+                                        </p:tgtEl>
+                                        <p:attrNameLst>
+                                          <p:attrName>style.visibility</p:attrName>
+                                        </p:attrNameLst>
+                                      </p:cBhvr>
+                                      <p:to>
+                                        <p:strVal val="visible"/>
+                                      </p:to>
+                                    </p:set>
+                                    <p:anim calcmode="lin" valueType="num">
+                                      <p:cBhvr additive="base">
+                                        <p:cTn id="13" dur="500" fill="hold"/>
+                                        <p:tgtEl>
+                                          <p:spTgt spid="28">
+                                            <p:txEl>
+                                              <p:pRg st="1" end="1"/>
+                                            </p:txEl>
+                                          </p:spTgt>
+                                        </p:tgtEl>
+                                        <p:attrNameLst>
+                                          <p:attrName>ppt_x</p:attrName>
+                                        </p:attrNameLst>
+                                      </p:cBhvr>
+                                      <p:tavLst>
+                                        <p:tav tm="0">
+                                          <p:val>
+                                            <p:strVal val="#ppt_x"/>
+                                          </p:val>
+                                        </p:tav>
+                                        <p:tav tm="100000">
+                                          <p:val>
+                                            <p:strVal val="#ppt_x"/>
+                                          </p:val>
+                                        </p:tav>
+                                      </p:tavLst>
+                                    </p:anim>
+                                    <p:anim calcmode="lin" valueType="num">
+                                      <p:cBhvr additive="base">
+                                        <p:cTn id="14" dur="500" fill="hold"/>
+                                        <p:tgtEl>
+                                          <p:spTgt spid="28">
+                                            <p:txEl>
+                                              <p:pRg st="1" end="1"/>
+                                            </p:txEl>
+                                          </p:spTgt>
+                                        </p:tgtEl>
+                                        <p:attrNameLst>
+                                          <p:attrName>ppt_y</p:attrName>
+                                        </p:attrNameLst>
+                                      </p:cBhvr>
+                                      <p:tavLst>
+                                        <p:tav tm="0">
+                                          <p:val>
+                                            <p:strVal val="1+#ppt_h/2"/>
+                                          </p:val>
+                                        </p:tav>
+                                        <p:tav tm="100000">
+                                          <p:val>
+                                            <p:strVal val="#ppt_y"/>
+                                          </p:val>
+                                        </p:tav>
+                                      </p:tavLst>
+                                    </p:anim>
+                                  </p:childTnLst>
+                                </p:cTn>
+                              </p:par>
+                            </p:childTnLst>
+                          </p:cTn>
+                        </p:par>
+                      </p:childTnLst>
+                    </p:cTn>
+                  </p:par>
+                  <p:par>
+                    <p:cTn id="15" fill="hold">
+                      <p:stCondLst>
+                        <p:cond delay="indefinite"/>
+                      </p:stCondLst>
+                      <p:childTnLst>
+                        <p:par>
+                          <p:cTn id="16" fill="hold">
+                            <p:stCondLst>
+                              <p:cond delay="0"/>
+                            </p:stCondLst>
+                            <p:childTnLst>
+                              <p:par>
+                                <p:cTn id="17" presetID="2" presetClass="entr" presetSubtype="4" fill="hold" grpId="0" nodeType="clickEffect">
+                                  <p:stCondLst>
+                                    <p:cond delay="0"/>
+                                  </p:stCondLst>
+                                  <p:childTnLst>
+                                    <p:set>
+                                      <p:cBhvr>
+                                        <p:cTn id="18" dur="1" fill="hold">
+                                          <p:stCondLst>
+                                            <p:cond delay="0"/>
+                                          </p:stCondLst>
+                                        </p:cTn>
+                                        <p:tgtEl>
+                                          <p:spTgt spid="28">
+                                            <p:txEl>
+                                              <p:pRg st="2" end="2"/>
+                                            </p:txEl>
+                                          </p:spTgt>
+                                        </p:tgtEl>
+                                        <p:attrNameLst>
+                                          <p:attrName>style.visibility</p:attrName>
+                                        </p:attrNameLst>
+                                      </p:cBhvr>
+                                      <p:to>
+                                        <p:strVal val="visible"/>
+                                      </p:to>
+                                    </p:set>
+                                    <p:anim calcmode="lin" valueType="num">
+                                      <p:cBhvr additive="base">
+                                        <p:cTn id="19" dur="500" fill="hold"/>
+                                        <p:tgtEl>
+                                          <p:spTgt spid="28">
+                                            <p:txEl>
+                                              <p:pRg st="2" end="2"/>
+                                            </p:txEl>
+                                          </p:spTgt>
+                                        </p:tgtEl>
+                                        <p:attrNameLst>
+                                          <p:attrName>ppt_x</p:attrName>
+                                        </p:attrNameLst>
+                                      </p:cBhvr>
+                                      <p:tavLst>
+                                        <p:tav tm="0">
+                                          <p:val>
+                                            <p:strVal val="#ppt_x"/>
+                                          </p:val>
+                                        </p:tav>
+                                        <p:tav tm="100000">
+                                          <p:val>
+                                            <p:strVal val="#ppt_x"/>
+                                          </p:val>
+                                        </p:tav>
+                                      </p:tavLst>
+                                    </p:anim>
+                                    <p:anim calcmode="lin" valueType="num">
+                                      <p:cBhvr additive="base">
+                                        <p:cTn id="20" dur="500" fill="hold"/>
+                                        <p:tgtEl>
+                                          <p:spTgt spid="28">
+                                            <p:txEl>
+                                              <p:pRg st="2" end="2"/>
+                                            </p:txEl>
+                                          </p:spTgt>
+                                        </p:tgtEl>
+                                        <p:attrNameLst>
+                                          <p:attrName>ppt_y</p:attrName>
+                                        </p:attrNameLst>
+                                      </p:cBhvr>
+                                      <p:tavLst>
+                                        <p:tav tm="0">
+                                          <p:val>
+                                            <p:strVal val="1+#ppt_h/2"/>
+                                          </p:val>
+                                        </p:tav>
+                                        <p:tav tm="100000">
+                                          <p:val>
+                                            <p:strVal val="#ppt_y"/>
+                                          </p:val>
+                                        </p:tav>
+                                      </p:tavLst>
+                                    </p:anim>
+                                  </p:childTnLst>
+                                </p:cTn>
+                              </p:par>
+                            </p:childTnLst>
+                          </p:cTn>
+                        </p:par>
+                      </p:childTnLst>
+                    </p:cTn>
+                  </p:par>
+                  <p:par>
+                    <p:cTn id="21" fill="hold">
+                      <p:stCondLst>
+                        <p:cond delay="indefinite"/>
+                      </p:stCondLst>
+                      <p:childTnLst>
+                        <p:par>
+                          <p:cTn id="22" fill="hold">
+                            <p:stCondLst>
+                              <p:cond delay="0"/>
+                            </p:stCondLst>
+                            <p:childTnLst>
+                              <p:par>
+                                <p:cTn id="23" presetID="2" presetClass="entr" presetSubtype="4" fill="hold" grpId="0" nodeType="clickEffect">
+                                  <p:stCondLst>
+                                    <p:cond delay="0"/>
+                                  </p:stCondLst>
+                                  <p:childTnLst>
+                                    <p:set>
+                                      <p:cBhvr>
+                                        <p:cTn id="24" dur="1" fill="hold">
+                                          <p:stCondLst>
+                                            <p:cond delay="0"/>
+                                          </p:stCondLst>
+                                        </p:cTn>
+                                        <p:tgtEl>
+                                          <p:spTgt spid="28">
+                                            <p:txEl>
+                                              <p:pRg st="3" end="3"/>
+                                            </p:txEl>
+                                          </p:spTgt>
+                                        </p:tgtEl>
+                                        <p:attrNameLst>
+                                          <p:attrName>style.visibility</p:attrName>
+                                        </p:attrNameLst>
+                                      </p:cBhvr>
+                                      <p:to>
+                                        <p:strVal val="visible"/>
+                                      </p:to>
+                                    </p:set>
+                                    <p:anim calcmode="lin" valueType="num">
+                                      <p:cBhvr additive="base">
+                                        <p:cTn id="25" dur="500" fill="hold"/>
+                                        <p:tgtEl>
+                                          <p:spTgt spid="28">
+                                            <p:txEl>
+                                              <p:pRg st="3" end="3"/>
+                                            </p:txEl>
+                                          </p:spTgt>
+                                        </p:tgtEl>
+                                        <p:attrNameLst>
+                                          <p:attrName>ppt_x</p:attrName>
+                                        </p:attrNameLst>
+                                      </p:cBhvr>
+                                      <p:tavLst>
+                                        <p:tav tm="0">
+                                          <p:val>
+                                            <p:strVal val="#ppt_x"/>
+                                          </p:val>
+                                        </p:tav>
+                                        <p:tav tm="100000">
+                                          <p:val>
+                                            <p:strVal val="#ppt_x"/>
+                                          </p:val>
+                                        </p:tav>
+                                      </p:tavLst>
+                                    </p:anim>
+                                    <p:anim calcmode="lin" valueType="num">
+                                      <p:cBhvr additive="base">
+                                        <p:cTn id="26" dur="500" fill="hold"/>
+                                        <p:tgtEl>
+                                          <p:spTgt spid="28">
+                                            <p:txEl>
+                                              <p:pRg st="3" end="3"/>
+                                            </p:txEl>
+                                          </p:spTgt>
+                                        </p:tgtEl>
+                                        <p:attrNameLst>
+                                          <p:attrName>ppt_y</p:attrName>
+                                        </p:attrNameLst>
+                                      </p:cBhvr>
+                                      <p:tavLst>
+                                        <p:tav tm="0">
+                                          <p:val>
+                                            <p:strVal val="1+#ppt_h/2"/>
+                                          </p:val>
+                                        </p:tav>
+                                        <p:tav tm="100000">
+                                          <p:val>
+                                            <p:strVal val="#ppt_y"/>
+                                          </p:val>
+                                        </p:tav>
+                                      </p:tavLst>
+                                    </p:anim>
+                                  </p:childTnLst>
+                                </p:cTn>
+                              </p:par>
+                            </p:childTnLst>
+                          </p:cTn>
+                        </p:par>
+                      </p:childTnLst>
+                    </p:cTn>
+                  </p:par>
+                  <p:par>
+                    <p:cTn id="27" fill="hold">
+                      <p:stCondLst>
+                        <p:cond delay="indefinite"/>
+                      </p:stCondLst>
+                      <p:childTnLst>
+                        <p:par>
+                          <p:cTn id="28" fill="hold">
+                            <p:stCondLst>
+                              <p:cond delay="0"/>
+                            </p:stCondLst>
+                            <p:childTnLst>
+                              <p:par>
+                                <p:cTn id="29" presetID="2" presetClass="entr" presetSubtype="4" fill="hold" grpId="0" nodeType="clickEffect">
+                                  <p:stCondLst>
+                                    <p:cond delay="0"/>
+                                  </p:stCondLst>
+                                  <p:childTnLst>
+                                    <p:set>
+                                      <p:cBhvr>
+                                        <p:cTn id="30" dur="1" fill="hold">
+                                          <p:stCondLst>
+                                            <p:cond delay="0"/>
+                                          </p:stCondLst>
+                                        </p:cTn>
+                                        <p:tgtEl>
+                                          <p:spTgt spid="28">
+                                            <p:txEl>
+                                              <p:pRg st="4" end="4"/>
+                                            </p:txEl>
+                                          </p:spTgt>
+                                        </p:tgtEl>
+                                        <p:attrNameLst>
+                                          <p:attrName>style.visibility</p:attrName>
+                                        </p:attrNameLst>
+                                      </p:cBhvr>
+                                      <p:to>
+                                        <p:strVal val="visible"/>
+                                      </p:to>
+                                    </p:set>
+                                    <p:anim calcmode="lin" valueType="num">
+                                      <p:cBhvr additive="base">
+                                        <p:cTn id="31" dur="500" fill="hold"/>
+                                        <p:tgtEl>
+                                          <p:spTgt spid="28">
+                                            <p:txEl>
+                                              <p:pRg st="4" end="4"/>
+                                            </p:txEl>
+                                          </p:spTgt>
+                                        </p:tgtEl>
+                                        <p:attrNameLst>
+                                          <p:attrName>ppt_x</p:attrName>
+                                        </p:attrNameLst>
+                                      </p:cBhvr>
+                                      <p:tavLst>
+                                        <p:tav tm="0">
+                                          <p:val>
+                                            <p:strVal val="#ppt_x"/>
+                                          </p:val>
+                                        </p:tav>
+                                        <p:tav tm="100000">
+                                          <p:val>
+                                            <p:strVal val="#ppt_x"/>
+                                          </p:val>
+                                        </p:tav>
+                                      </p:tavLst>
+                                    </p:anim>
+                                    <p:anim calcmode="lin" valueType="num">
+                                      <p:cBhvr additive="base">
+                                        <p:cTn id="32" dur="500" fill="hold"/>
+                                        <p:tgtEl>
+                                          <p:spTgt spid="28">
+                                            <p:txEl>
+                                              <p:pRg st="4" end="4"/>
+                                            </p:txEl>
+                                          </p:spTgt>
+                                        </p:tgtEl>
+                                        <p:attrNameLst>
+                                          <p:attrName>ppt_y</p:attrName>
+                                        </p:attrNameLst>
+                                      </p:cBhvr>
+                                      <p:tavLst>
+                                        <p:tav tm="0">
+                                          <p:val>
+                                            <p:strVal val="1+#ppt_h/2"/>
+                                          </p:val>
+                                        </p:tav>
+                                        <p:tav tm="100000">
+                                          <p:val>
+                                            <p:strVal val="#ppt_y"/>
+                                          </p:val>
+                                        </p:tav>
+                                      </p:tavLst>
+                                    </p:anim>
+                                  </p:childTnLst>
+                                </p:cTn>
+                              </p:par>
+                            </p:childTnLst>
+                          </p:cTn>
+                        </p:par>
+                      </p:childTnLst>
+                    </p:cTn>
+                  </p:par>
+                  <p:par>
+                    <p:cTn id="33" fill="hold">
+                      <p:stCondLst>
+                        <p:cond delay="indefinite"/>
+                      </p:stCondLst>
+                      <p:childTnLst>
+                        <p:par>
+                          <p:cTn id="34" fill="hold">
+                            <p:stCondLst>
+                              <p:cond delay="0"/>
+                            </p:stCondLst>
+                            <p:childTnLst>
+                              <p:par>
+                                <p:cTn id="35" presetID="2" presetClass="entr" presetSubtype="4" fill="hold" grpId="0" nodeType="clickEffect">
+                                  <p:stCondLst>
+                                    <p:cond delay="0"/>
+                                  </p:stCondLst>
+                                  <p:childTnLst>
+                                    <p:set>
+                                      <p:cBhvr>
+                                        <p:cTn id="36" dur="1" fill="hold">
+                                          <p:stCondLst>
+                                            <p:cond delay="0"/>
+                                          </p:stCondLst>
+                                        </p:cTn>
+                                        <p:tgtEl>
+                                          <p:spTgt spid="28">
+                                            <p:txEl>
+                                              <p:pRg st="5" end="5"/>
+                                            </p:txEl>
+                                          </p:spTgt>
+                                        </p:tgtEl>
+                                        <p:attrNameLst>
+                                          <p:attrName>style.visibility</p:attrName>
+                                        </p:attrNameLst>
+                                      </p:cBhvr>
+                                      <p:to>
+                                        <p:strVal val="visible"/>
+                                      </p:to>
+                                    </p:set>
+                                    <p:anim calcmode="lin" valueType="num">
+                                      <p:cBhvr additive="base">
+                                        <p:cTn id="37" dur="500" fill="hold"/>
+                                        <p:tgtEl>
+                                          <p:spTgt spid="28">
+                                            <p:txEl>
+                                              <p:pRg st="5" end="5"/>
+                                            </p:txEl>
+                                          </p:spTgt>
+                                        </p:tgtEl>
+                                        <p:attrNameLst>
+                                          <p:attrName>ppt_x</p:attrName>
+                                        </p:attrNameLst>
+                                      </p:cBhvr>
+                                      <p:tavLst>
+                                        <p:tav tm="0">
+                                          <p:val>
+                                            <p:strVal val="#ppt_x"/>
+                                          </p:val>
+                                        </p:tav>
+                                        <p:tav tm="100000">
+                                          <p:val>
+                                            <p:strVal val="#ppt_x"/>
+                                          </p:val>
+                                        </p:tav>
+                                      </p:tavLst>
+                                    </p:anim>
+                                    <p:anim calcmode="lin" valueType="num">
+                                      <p:cBhvr additive="base">
+                                        <p:cTn id="38" dur="500" fill="hold"/>
+                                        <p:tgtEl>
+                                          <p:spTgt spid="28">
+                                            <p:txEl>
+                                              <p:pRg st="5" end="5"/>
+                                            </p:txEl>
+                                          </p:spTgt>
+                                        </p:tgtEl>
+                                        <p:attrNameLst>
+                                          <p:attrName>ppt_y</p:attrName>
+                                        </p:attrNameLst>
+                                      </p:cBhvr>
+                                      <p:tavLst>
+                                        <p:tav tm="0">
+                                          <p:val>
+                                            <p:strVal val="1+#ppt_h/2"/>
+                                          </p:val>
+                                        </p:tav>
+                                        <p:tav tm="100000">
+                                          <p:val>
+                                            <p:strVal val="#ppt_y"/>
+                                          </p:val>
+                                        </p:tav>
+                                      </p:tavLst>
+                                    </p:anim>
+                                  </p:childTnLst>
+                                </p:cTn>
+                              </p:par>
+                            </p:childTnLst>
+                          </p:cTn>
+                        </p:par>
+                      </p:childTnLst>
+                    </p:cTn>
+                  </p:par>
+                  <p:par>
+                    <p:cTn id="39" fill="hold">
+                      <p:stCondLst>
+                        <p:cond delay="indefinite"/>
+                      </p:stCondLst>
+                      <p:childTnLst>
+                        <p:par>
+                          <p:cTn id="40" fill="hold">
+                            <p:stCondLst>
+                              <p:cond delay="0"/>
+                            </p:stCondLst>
+                            <p:childTnLst>
+                              <p:par>
+                                <p:cTn id="41" presetID="2" presetClass="entr" presetSubtype="4" fill="hold" grpId="0" nodeType="clickEffect">
+                                  <p:stCondLst>
+                                    <p:cond delay="0"/>
+                                  </p:stCondLst>
+                                  <p:childTnLst>
+                                    <p:set>
+                                      <p:cBhvr>
+                                        <p:cTn id="42" dur="1" fill="hold">
+                                          <p:stCondLst>
+                                            <p:cond delay="0"/>
+                                          </p:stCondLst>
+                                        </p:cTn>
+                                        <p:tgtEl>
+                                          <p:spTgt spid="28">
+                                            <p:txEl>
+                                              <p:pRg st="6" end="6"/>
+                                            </p:txEl>
+                                          </p:spTgt>
+                                        </p:tgtEl>
+                                        <p:attrNameLst>
+                                          <p:attrName>style.visibility</p:attrName>
+                                        </p:attrNameLst>
+                                      </p:cBhvr>
+                                      <p:to>
+                                        <p:strVal val="visible"/>
+                                      </p:to>
+                                    </p:set>
+                                    <p:anim calcmode="lin" valueType="num">
+                                      <p:cBhvr additive="base">
+                                        <p:cTn id="43" dur="500" fill="hold"/>
+                                        <p:tgtEl>
+                                          <p:spTgt spid="28">
+                                            <p:txEl>
+                                              <p:pRg st="6" end="6"/>
+                                            </p:txEl>
+                                          </p:spTgt>
+                                        </p:tgtEl>
+                                        <p:attrNameLst>
+                                          <p:attrName>ppt_x</p:attrName>
+                                        </p:attrNameLst>
+                                      </p:cBhvr>
+                                      <p:tavLst>
+                                        <p:tav tm="0">
+                                          <p:val>
+                                            <p:strVal val="#ppt_x"/>
+                                          </p:val>
+                                        </p:tav>
+                                        <p:tav tm="100000">
+                                          <p:val>
+                                            <p:strVal val="#ppt_x"/>
+                                          </p:val>
+                                        </p:tav>
+                                      </p:tavLst>
+                                    </p:anim>
+                                    <p:anim calcmode="lin" valueType="num">
+                                      <p:cBhvr additive="base">
+                                        <p:cTn id="44" dur="500" fill="hold"/>
+                                        <p:tgtEl>
+                                          <p:spTgt spid="28">
+                                            <p:txEl>
+                                              <p:pRg st="6" end="6"/>
+                                            </p:txEl>
+                                          </p:spTgt>
+                                        </p:tgtEl>
+                                        <p:attrNameLst>
+                                          <p:attrName>ppt_y</p:attrName>
+                                        </p:attrNameLst>
+                                      </p:cBhvr>
+                                      <p:tavLst>
+                                        <p:tav tm="0">
+                                          <p:val>
+                                            <p:strVal val="1+#ppt_h/2"/>
+                                          </p:val>
+                                        </p:tav>
+                                        <p:tav tm="100000">
+                                          <p:val>
+                                            <p:strVal val="#ppt_y"/>
+                                          </p:val>
+                                        </p:tav>
+                                      </p:tavLst>
+                                    </p:anim>
+                                  </p:childTnLst>
+                                </p:cTn>
+                              </p:par>
+                            </p:childTnLst>
+                          </p:cTn>
+                        </p:par>
+                      </p:childTnLst>
+                    </p:cTn>
+                  </p:par>
+                </p:childTnLst>
+              </p:cTn>
+              <p:prevCondLst>
+                <p:cond evt="onPrev" delay="0">
+                  <p:tgtEl>
+                    <p:sldTgt/>
+                  </p:tgtEl>
+                </p:cond>
+              </p:prevCondLst>
+              <p:nextCondLst>
+                <p:cond evt="onNext" delay="0">
+                  <p:tgtEl>
+                    <p:sldTgt/>
+                  </p:tgtEl>
+                </p:cond>
+              </p:nextCondLst>
+            </p:seq>
+          </p:childTnLst>
+        </p:cTn>
+      </p:par>
+    </p:tnLst>
+    <p:bldLst>
+      <p:bldP spid="28" grpId="0" build="p"/>
     </p:bldLst>
   </p:timing>
 </p:sld>
@@ -8556,13 +13061,19 @@
         <p:spPr/>
         <p:txBody>
           <a:bodyPr>
-            <a:normAutofit lnSpcReduction="10000"/>
+            <a:normAutofit fontScale="92500" lnSpcReduction="10000"/>
           </a:bodyPr>
           <a:lstStyle/>
           <a:p>
             <a:r>
               <a:rPr lang="en-US" dirty="0"/>
               <a:t>This is all unofficial</a:t>
+            </a:r>
+          </a:p>
+          <a:p>
+            <a:r>
+              <a:rPr lang="en-US" dirty="0"/>
+              <a:t>This is a work in progress</a:t>
             </a:r>
           </a:p>
           <a:p>
@@ -9426,6 +13937,109 @@
                                           <p:spTgt spid="3">
                                             <p:txEl>
                                               <p:pRg st="7" end="7"/>
+                                            </p:txEl>
+                                          </p:spTgt>
+                                        </p:tgtEl>
+                                        <p:attrNameLst>
+                                          <p:attrName>ppt_y</p:attrName>
+                                        </p:attrNameLst>
+                                      </p:cBhvr>
+                                      <p:tavLst>
+                                        <p:tav tm="0">
+                                          <p:val>
+                                            <p:strVal val="1+#ppt_h/2"/>
+                                          </p:val>
+                                        </p:tav>
+                                        <p:tav tm="100000">
+                                          <p:val>
+                                            <p:strVal val="#ppt_y"/>
+                                          </p:val>
+                                        </p:tav>
+                                      </p:tavLst>
+                                    </p:anim>
+                                  </p:childTnLst>
+                                </p:cTn>
+                              </p:par>
+                            </p:childTnLst>
+                          </p:cTn>
+                        </p:par>
+                      </p:childTnLst>
+                    </p:cTn>
+                  </p:par>
+                  <p:par>
+                    <p:cTn id="51" fill="hold">
+                      <p:stCondLst>
+                        <p:cond delay="indefinite"/>
+                      </p:stCondLst>
+                      <p:childTnLst>
+                        <p:par>
+                          <p:cTn id="52" fill="hold">
+                            <p:stCondLst>
+                              <p:cond delay="0"/>
+                            </p:stCondLst>
+                            <p:childTnLst>
+                              <p:par>
+                                <p:cTn id="53" presetID="2" presetClass="entr" presetSubtype="4" fill="hold" grpId="0" nodeType="clickEffect">
+                                  <p:stCondLst>
+                                    <p:cond delay="0"/>
+                                  </p:stCondLst>
+                                  <p:childTnLst>
+                                    <p:set>
+                                      <p:cBhvr>
+                                        <p:cTn id="54" dur="1" fill="hold">
+                                          <p:stCondLst>
+                                            <p:cond delay="0"/>
+                                          </p:stCondLst>
+                                        </p:cTn>
+                                        <p:tgtEl>
+                                          <p:spTgt spid="3">
+                                            <p:txEl>
+                                              <p:pRg st="8" end="8"/>
+                                            </p:txEl>
+                                          </p:spTgt>
+                                        </p:tgtEl>
+                                        <p:attrNameLst>
+                                          <p:attrName>style.visibility</p:attrName>
+                                        </p:attrNameLst>
+                                      </p:cBhvr>
+                                      <p:to>
+                                        <p:strVal val="visible"/>
+                                      </p:to>
+                                    </p:set>
+                                    <p:anim calcmode="lin" valueType="num">
+                                      <p:cBhvr additive="base">
+                                        <p:cTn id="55" dur="500" fill="hold"/>
+                                        <p:tgtEl>
+                                          <p:spTgt spid="3">
+                                            <p:txEl>
+                                              <p:pRg st="8" end="8"/>
+                                            </p:txEl>
+                                          </p:spTgt>
+                                        </p:tgtEl>
+                                        <p:attrNameLst>
+                                          <p:attrName>ppt_x</p:attrName>
+                                        </p:attrNameLst>
+                                      </p:cBhvr>
+                                      <p:tavLst>
+                                        <p:tav tm="0">
+                                          <p:val>
+                                            <p:strVal val="#ppt_x"/>
+                                          </p:val>
+                                        </p:tav>
+                                        <p:tav tm="100000">
+                                          <p:val>
+                                            <p:strVal val="#ppt_x"/>
+                                          </p:val>
+                                        </p:tav>
+                                      </p:tavLst>
+                                    </p:anim>
+                                    <p:anim calcmode="lin" valueType="num">
+                                      <p:cBhvr additive="base">
+                                        <p:cTn id="56" dur="500" fill="hold"/>
+                                        <p:tgtEl>
+                                          <p:spTgt spid="3">
+                                            <p:txEl>
+                                              <p:pRg st="8" end="8"/>
                                             </p:txEl>
                                           </p:spTgt>
                                         </p:tgtEl>
@@ -9610,10 +14224,7 @@
             </a:avLst>
           </a:prstGeom>
           <a:solidFill>
-            <a:schemeClr val="tx1">
-              <a:lumMod val="65000"/>
-              <a:lumOff val="35000"/>
-            </a:schemeClr>
+            <a:srgbClr val="C00000"/>
           </a:solidFill>
         </p:spPr>
         <p:style>

</xml_diff>